<commit_message>
Final(?) update before workshop starts...
</commit_message>
<xml_diff>
--- a/FnConf2016/Workshop/Intro 2016.pptx
+++ b/FnConf2016/Workshop/Intro 2016.pptx
@@ -5,7 +5,7 @@
     <p:sldMasterId id="2147483648" r:id="rId1"/>
   </p:sldMasterIdLst>
   <p:notesMasterIdLst>
-    <p:notesMasterId r:id="rId29"/>
+    <p:notesMasterId r:id="rId27"/>
   </p:notesMasterIdLst>
   <p:sldIdLst>
     <p:sldId id="256" r:id="rId2"/>
@@ -18,23 +18,21 @@
     <p:sldId id="263" r:id="rId9"/>
     <p:sldId id="264" r:id="rId10"/>
     <p:sldId id="265" r:id="rId11"/>
-    <p:sldId id="266" r:id="rId12"/>
-    <p:sldId id="267" r:id="rId13"/>
-    <p:sldId id="268" r:id="rId14"/>
-    <p:sldId id="269" r:id="rId15"/>
-    <p:sldId id="270" r:id="rId16"/>
-    <p:sldId id="271" r:id="rId17"/>
-    <p:sldId id="272" r:id="rId18"/>
-    <p:sldId id="273" r:id="rId19"/>
-    <p:sldId id="274" r:id="rId20"/>
-    <p:sldId id="275" r:id="rId21"/>
-    <p:sldId id="276" r:id="rId22"/>
-    <p:sldId id="277" r:id="rId23"/>
-    <p:sldId id="278" r:id="rId24"/>
-    <p:sldId id="279" r:id="rId25"/>
-    <p:sldId id="280" r:id="rId26"/>
-    <p:sldId id="281" r:id="rId27"/>
-    <p:sldId id="282" r:id="rId28"/>
+    <p:sldId id="267" r:id="rId12"/>
+    <p:sldId id="268" r:id="rId13"/>
+    <p:sldId id="269" r:id="rId14"/>
+    <p:sldId id="270" r:id="rId15"/>
+    <p:sldId id="271" r:id="rId16"/>
+    <p:sldId id="272" r:id="rId17"/>
+    <p:sldId id="273" r:id="rId18"/>
+    <p:sldId id="274" r:id="rId19"/>
+    <p:sldId id="275" r:id="rId20"/>
+    <p:sldId id="276" r:id="rId21"/>
+    <p:sldId id="277" r:id="rId22"/>
+    <p:sldId id="278" r:id="rId23"/>
+    <p:sldId id="279" r:id="rId24"/>
+    <p:sldId id="281" r:id="rId25"/>
+    <p:sldId id="282" r:id="rId26"/>
   </p:sldIdLst>
   <p:sldSz cx="9144000" cy="6858000" type="screen4x3"/>
   <p:notesSz cx="6858000" cy="9144000"/>
@@ -234,7 +232,7 @@
           <a:p>
             <a:fld id="{CDEAEF8A-5BB8-41C8-B8C2-160617C17EF4}" type="datetimeFigureOut">
               <a:rPr lang="en-GB" smtClean="0"/>
-              <a:t>15/10/2016</a:t>
+              <a:t>16/10/2016</a:t>
             </a:fld>
             <a:endParaRPr lang="en-GB"/>
           </a:p>
@@ -809,7 +807,7 @@
               <a:pPr>
                 <a:defRPr/>
               </a:pPr>
-              <a:t>23</a:t>
+              <a:t>22</a:t>
             </a:fld>
             <a:endParaRPr lang="en-US"/>
           </a:p>
@@ -2663,7 +2661,7 @@
         <p:spPr/>
         <p:txBody>
           <a:bodyPr>
-            <a:normAutofit fontScale="92500" lnSpcReduction="10000"/>
+            <a:normAutofit fontScale="92500" lnSpcReduction="20000"/>
           </a:bodyPr>
           <a:lstStyle/>
           <a:p>
@@ -2672,23 +2670,25 @@
             </a:br>
             <a:r>
               <a:rPr lang="da-DK" dirty="0"/>
-              <a:t>Jay Foad</a:t>
+              <a:t>Morten Kromberg</a:t>
             </a:r>
             <a:br>
               <a:rPr lang="da-DK" dirty="0"/>
             </a:br>
             <a:r>
               <a:rPr lang="da-DK" dirty="0"/>
-              <a:t>Morten Kromberg</a:t>
-            </a:r>
-            <a:br>
-              <a:rPr lang="da-DK" dirty="0"/>
-            </a:br>
-            <a:r>
-              <a:rPr lang="da-DK" dirty="0"/>
               <a:t>Roger Hui</a:t>
             </a:r>
-            <a:endParaRPr lang="en-GB" dirty="0"/>
+          </a:p>
+          <a:p>
+            <a:endParaRPr lang="da-DK" sz="1900" dirty="0"/>
+          </a:p>
+          <a:p>
+            <a:r>
+              <a:rPr lang="da-DK" sz="1900" dirty="0"/>
+              <a:t>(based on work by Jay Foad &amp; John Scholes)</a:t>
+            </a:r>
+            <a:endParaRPr lang="en-GB" sz="1900" dirty="0"/>
           </a:p>
         </p:txBody>
       </p:sp>
@@ -3182,8 +3182,8 @@
           <a:lstStyle/>
           <a:p>
             <a:r>
-              <a:rPr lang="en-US" sz="3600" dirty="0"/>
-              <a:t>Indexing and Partial Assignment</a:t>
+              <a:rPr lang="en-US" dirty="0"/>
+              <a:t>Reading APL</a:t>
             </a:r>
           </a:p>
         </p:txBody>
@@ -3203,24 +3203,46 @@
           <a:bodyPr/>
           <a:lstStyle/>
           <a:p>
-            <a:pPr marL="0" indent="0">
+            <a:pPr>
+              <a:buFontTx/>
               <a:buNone/>
             </a:pPr>
             <a:r>
-              <a:rPr lang="da-DK" sz="1800" dirty="0"/>
-              <a:t>]demo indexing.txt</a:t>
-            </a:r>
-            <a:endParaRPr lang="en-GB" sz="1800" dirty="0"/>
-          </a:p>
-          <a:p>
-            <a:endParaRPr lang="en-US" sz="1800" dirty="0"/>
+              <a:rPr lang="da-DK" altLang="en-US" sz="2800" b="1" dirty="0">
+                <a:latin typeface="APL385 Unicode" panose="020B0709000202000203" pitchFamily="49" charset="0"/>
+              </a:rPr>
+              <a:t>   CB←{⍵[1+(⍴⍵)|X∘.+X←(⍳⍺)-1]}</a:t>
+            </a:r>
+          </a:p>
+          <a:p>
+            <a:pPr>
+              <a:buFontTx/>
+              <a:buNone/>
+            </a:pPr>
+            <a:endParaRPr lang="da-DK" altLang="en-US" sz="2400" dirty="0"/>
+          </a:p>
+          <a:p>
+            <a:pPr>
+              <a:buFontTx/>
+              <a:buNone/>
+            </a:pPr>
+            <a:r>
+              <a:rPr lang="da-DK" altLang="en-US" sz="2400" dirty="0"/>
+              <a:t>Imagine arguments:</a:t>
+            </a:r>
+            <a:r>
+              <a:rPr lang="da-DK" altLang="en-US" sz="2400" b="1" dirty="0">
+                <a:latin typeface="APL385 Unicode" panose="020B0709000202000203" pitchFamily="49" charset="0"/>
+              </a:rPr>
+              <a:t>    8 CB ' ⎕'</a:t>
+            </a:r>
           </a:p>
         </p:txBody>
       </p:sp>
     </p:spTree>
     <p:extLst>
       <p:ext uri="{BB962C8B-B14F-4D97-AF65-F5344CB8AC3E}">
-        <p14:creationId xmlns:p14="http://schemas.microsoft.com/office/powerpoint/2010/main" val="163100696"/>
+        <p14:creationId xmlns:p14="http://schemas.microsoft.com/office/powerpoint/2010/main" val="1024154772"/>
       </p:ext>
     </p:extLst>
   </p:cSld>
@@ -3284,46 +3306,91 @@
           <a:bodyPr/>
           <a:lstStyle/>
           <a:p>
-            <a:pPr>
-              <a:buFontTx/>
+            <a:pPr marL="0" indent="0">
               <a:buNone/>
             </a:pPr>
             <a:r>
-              <a:rPr lang="da-DK" altLang="en-US" sz="2800" b="1" dirty="0">
-                <a:latin typeface="APL385 Unicode" panose="020B0709000202000203" pitchFamily="49" charset="0"/>
-              </a:rPr>
-              <a:t>   CB←{⍵[1+(⍴⍵)|X∘.+X←(⍳⍺)-1]}</a:t>
-            </a:r>
-          </a:p>
-          <a:p>
-            <a:pPr>
-              <a:buFontTx/>
+              <a:rPr lang="en-GB" sz="2300" b="1" dirty="0">
+                <a:latin typeface="APL385 Unicode" panose="020B0709000202000203" pitchFamily="49" charset="0"/>
+              </a:rPr>
+              <a:t>life←{↑1 ⍵∨.∧3 4=+/,¯1 0 1∘.⊖¯1 0 1∘.⌽⊂⍵}</a:t>
+            </a:r>
+          </a:p>
+          <a:p>
+            <a:pPr marL="0" indent="0">
               <a:buNone/>
             </a:pPr>
-            <a:endParaRPr lang="da-DK" altLang="en-US" sz="2400" dirty="0"/>
-          </a:p>
-          <a:p>
-            <a:pPr>
-              <a:buFontTx/>
+            <a:endParaRPr lang="da-DK" sz="2400" dirty="0">
+              <a:latin typeface="APL385 Unicode" panose="020B0709000202000203" pitchFamily="49" charset="0"/>
+            </a:endParaRPr>
+          </a:p>
+          <a:p>
+            <a:pPr marL="0" indent="0">
               <a:buNone/>
             </a:pPr>
             <a:r>
-              <a:rPr lang="da-DK" altLang="en-US" sz="2400" dirty="0"/>
-              <a:t>Imagine arguments:</a:t>
-            </a:r>
-            <a:r>
-              <a:rPr lang="da-DK" altLang="en-US" sz="2400" b="1" dirty="0">
-                <a:latin typeface="APL385 Unicode" panose="020B0709000202000203" pitchFamily="49" charset="0"/>
-              </a:rPr>
-              <a:t>    8 CB ' ⎕'</a:t>
-            </a:r>
+              <a:rPr lang="en-GB" sz="2400" dirty="0">
+                <a:hlinkClick r:id="rId2"/>
+              </a:rPr>
+              <a:t>http://dfns.dyalog.com/n_life.htm</a:t>
+            </a:r>
+            <a:br>
+              <a:rPr lang="en-GB" sz="2400" dirty="0"/>
+            </a:br>
+            <a:r>
+              <a:rPr lang="en-GB" sz="2400" dirty="0">
+                <a:hlinkClick r:id="rId3"/>
+              </a:rPr>
+              <a:t>http://www.youtube.com/watch?v=a9xAKttWgP4</a:t>
+            </a:r>
+            <a:endParaRPr lang="en-GB" sz="2400" dirty="0"/>
+          </a:p>
+          <a:p>
+            <a:pPr marL="0" indent="0">
+              <a:buNone/>
+            </a:pPr>
+            <a:endParaRPr lang="en-GB" sz="2400" dirty="0">
+              <a:latin typeface="APL385 Unicode" panose="020B0709000202000203" pitchFamily="49" charset="0"/>
+            </a:endParaRPr>
+          </a:p>
+          <a:p>
+            <a:r>
+              <a:rPr lang="en-GB" sz="2400" dirty="0"/>
+              <a:t>Try it out in small chunks, starting from the right.</a:t>
+            </a:r>
+          </a:p>
+          <a:p>
+            <a:r>
+              <a:rPr lang="en-GB" sz="2400" dirty="0"/>
+              <a:t>Know what's a function and what's an operator.</a:t>
+            </a:r>
+          </a:p>
+          <a:p>
+            <a:r>
+              <a:rPr lang="en-GB" sz="2400" dirty="0"/>
+              <a:t>Note the creative use of inner product.</a:t>
+            </a:r>
+          </a:p>
+          <a:p>
+            <a:r>
+              <a:rPr lang="en-GB" sz="2400" dirty="0"/>
+              <a:t>Finally try reading it from left to right.</a:t>
+            </a:r>
+          </a:p>
+          <a:p>
+            <a:pPr marL="0" indent="0">
+              <a:buNone/>
+            </a:pPr>
+            <a:endParaRPr lang="en-GB" sz="2400" dirty="0">
+              <a:latin typeface="APL385 Unicode" panose="020B0709000202000203" pitchFamily="49" charset="0"/>
+            </a:endParaRPr>
           </a:p>
         </p:txBody>
       </p:sp>
     </p:spTree>
     <p:extLst>
       <p:ext uri="{BB962C8B-B14F-4D97-AF65-F5344CB8AC3E}">
-        <p14:creationId xmlns:p14="http://schemas.microsoft.com/office/powerpoint/2010/main" val="1024154772"/>
+        <p14:creationId xmlns:p14="http://schemas.microsoft.com/office/powerpoint/2010/main" val="609912707"/>
       </p:ext>
     </p:extLst>
   </p:cSld>
@@ -3362,13 +3429,19 @@
         </p:nvSpPr>
         <p:spPr/>
         <p:txBody>
-          <a:bodyPr/>
+          <a:bodyPr>
+            <a:normAutofit fontScale="90000"/>
+          </a:bodyPr>
           <a:lstStyle/>
           <a:p>
             <a:r>
-              <a:rPr lang="en-US" dirty="0"/>
-              <a:t>Reading APL</a:t>
-            </a:r>
+              <a:rPr lang="en-GB" dirty="0"/>
+              <a:t>Quirks that you may notice:</a:t>
+            </a:r>
+            <a:br>
+              <a:rPr lang="en-GB" dirty="0"/>
+            </a:br>
+            <a:endParaRPr lang="en-GB" dirty="0"/>
           </a:p>
         </p:txBody>
       </p:sp>
@@ -3387,91 +3460,62 @@
           <a:bodyPr/>
           <a:lstStyle/>
           <a:p>
-            <a:pPr marL="0" indent="0">
-              <a:buNone/>
-            </a:pPr>
-            <a:r>
-              <a:rPr lang="en-GB" sz="2300" b="1" dirty="0">
-                <a:latin typeface="APL385 Unicode" panose="020B0709000202000203" pitchFamily="49" charset="0"/>
-              </a:rPr>
-              <a:t>life←{↑1 ⍵∨.∧3 4=+/,¯1 0 1∘.⊖¯1 0 1∘.⌽⊂⍵}</a:t>
-            </a:r>
-          </a:p>
-          <a:p>
-            <a:pPr marL="0" indent="0">
-              <a:buNone/>
-            </a:pPr>
-            <a:endParaRPr lang="da-DK" sz="2400" dirty="0">
-              <a:latin typeface="APL385 Unicode" panose="020B0709000202000203" pitchFamily="49" charset="0"/>
-            </a:endParaRPr>
-          </a:p>
-          <a:p>
-            <a:pPr marL="0" indent="0">
-              <a:buNone/>
-            </a:pPr>
-            <a:r>
-              <a:rPr lang="en-GB" sz="2400" dirty="0">
-                <a:hlinkClick r:id="rId2"/>
-              </a:rPr>
-              <a:t>http://dfns.dyalog.com/n_life.htm</a:t>
-            </a:r>
-            <a:br>
-              <a:rPr lang="en-GB" sz="2400" dirty="0"/>
-            </a:br>
-            <a:r>
-              <a:rPr lang="en-GB" sz="2400" dirty="0">
-                <a:hlinkClick r:id="rId3"/>
-              </a:rPr>
-              <a:t>http://www.youtube.com/watch?v=a9xAKttWgP4</a:t>
-            </a:r>
-            <a:endParaRPr lang="en-GB" sz="2400" dirty="0"/>
-          </a:p>
-          <a:p>
-            <a:pPr marL="0" indent="0">
-              <a:buNone/>
-            </a:pPr>
-            <a:endParaRPr lang="en-GB" sz="2400" dirty="0">
-              <a:latin typeface="APL385 Unicode" panose="020B0709000202000203" pitchFamily="49" charset="0"/>
-            </a:endParaRPr>
-          </a:p>
-          <a:p>
-            <a:r>
-              <a:rPr lang="en-GB" sz="2400" dirty="0"/>
-              <a:t>Try it out in small chunks, starting from the right.</a:t>
-            </a:r>
-          </a:p>
-          <a:p>
-            <a:r>
-              <a:rPr lang="en-GB" sz="2400" dirty="0"/>
-              <a:t>Know what's a function and what's an operator.</a:t>
-            </a:r>
-          </a:p>
-          <a:p>
-            <a:r>
-              <a:rPr lang="en-GB" sz="2400" dirty="0"/>
-              <a:t>Note the creative use of inner product.</a:t>
-            </a:r>
-          </a:p>
-          <a:p>
-            <a:r>
-              <a:rPr lang="en-GB" sz="2400" dirty="0"/>
-              <a:t>Finally try reading it from left to right.</a:t>
-            </a:r>
-          </a:p>
-          <a:p>
-            <a:pPr marL="0" indent="0">
-              <a:buNone/>
-            </a:pPr>
-            <a:endParaRPr lang="en-GB" sz="2400" dirty="0">
-              <a:latin typeface="APL385 Unicode" panose="020B0709000202000203" pitchFamily="49" charset="0"/>
-            </a:endParaRPr>
+            <a:r>
+              <a:rPr lang="en-GB" sz="2800" dirty="0"/>
+              <a:t>Some APL programmers like to avoid parentheses, to reduce the cognitive load!</a:t>
+            </a:r>
+          </a:p>
+          <a:p>
+            <a:r>
+              <a:rPr lang="en-GB" sz="2800" dirty="0"/>
+              <a:t>Hence, put simple argument on left: </a:t>
+            </a:r>
+            <a:r>
+              <a:rPr lang="en-GB" sz="2800" dirty="0">
+                <a:latin typeface="APL385 Unicode" panose="020B0709000202000203" pitchFamily="49" charset="0"/>
+              </a:rPr>
+              <a:t>1+...</a:t>
+            </a:r>
+          </a:p>
+          <a:p>
+            <a:r>
+              <a:rPr lang="en-GB" sz="2800" dirty="0"/>
+              <a:t>Or, use Commute: </a:t>
+            </a:r>
+            <a:r>
+              <a:rPr lang="en-GB" sz="2800" dirty="0">
+                <a:latin typeface="APL385 Unicode" panose="020B0709000202000203" pitchFamily="49" charset="0"/>
+              </a:rPr>
+              <a:t>2*⍨</a:t>
+            </a:r>
+            <a:r>
+              <a:rPr lang="en-GB" sz="2800" dirty="0"/>
+              <a:t>...</a:t>
+            </a:r>
+          </a:p>
+          <a:p>
+            <a:r>
+              <a:rPr lang="en-GB" sz="2800" dirty="0"/>
+              <a:t>N.B. game of life has no parentheses, partly because (some) primitives (e.g. Residue) were carefully designed to be most useful with a simple constant on the </a:t>
+            </a:r>
+            <a:r>
+              <a:rPr lang="en-GB" sz="2800" i="1" dirty="0"/>
+              <a:t>left</a:t>
+            </a:r>
+            <a:r>
+              <a:rPr lang="en-GB" sz="2800" dirty="0"/>
+              <a:t>.</a:t>
+            </a:r>
+          </a:p>
+          <a:p>
+            <a:endParaRPr lang="en-GB" sz="2800" dirty="0"/>
           </a:p>
         </p:txBody>
       </p:sp>
     </p:spTree>
     <p:extLst>
       <p:ext uri="{BB962C8B-B14F-4D97-AF65-F5344CB8AC3E}">
-        <p14:creationId xmlns:p14="http://schemas.microsoft.com/office/powerpoint/2010/main" val="609912707"/>
+        <p14:creationId xmlns:p14="http://schemas.microsoft.com/office/powerpoint/2010/main" val="4082523071"/>
       </p:ext>
     </p:extLst>
   </p:cSld>
@@ -3510,19 +3554,13 @@
         </p:nvSpPr>
         <p:spPr/>
         <p:txBody>
-          <a:bodyPr>
-            <a:normAutofit fontScale="90000"/>
-          </a:bodyPr>
+          <a:bodyPr/>
           <a:lstStyle/>
           <a:p>
             <a:r>
-              <a:rPr lang="en-GB" dirty="0"/>
-              <a:t>Quirks that you may notice:</a:t>
-            </a:r>
-            <a:br>
-              <a:rPr lang="en-GB" dirty="0"/>
-            </a:br>
-            <a:endParaRPr lang="en-GB" dirty="0"/>
+              <a:rPr lang="en-US" dirty="0"/>
+              <a:t>Reading APL</a:t>
+            </a:r>
           </a:p>
         </p:txBody>
       </p:sp>
@@ -3541,62 +3579,64 @@
           <a:bodyPr/>
           <a:lstStyle/>
           <a:p>
-            <a:r>
-              <a:rPr lang="en-GB" sz="2800" dirty="0"/>
-              <a:t>Some APL programmers like to avoid parentheses, to reduce the cognitive load!</a:t>
-            </a:r>
-          </a:p>
-          <a:p>
-            <a:r>
-              <a:rPr lang="en-GB" sz="2800" dirty="0"/>
-              <a:t>Hence, put simple argument on left: </a:t>
-            </a:r>
-            <a:r>
-              <a:rPr lang="en-GB" sz="2800" dirty="0">
-                <a:latin typeface="APL385 Unicode" panose="020B0709000202000203" pitchFamily="49" charset="0"/>
-              </a:rPr>
-              <a:t>1+...</a:t>
-            </a:r>
-          </a:p>
-          <a:p>
-            <a:r>
-              <a:rPr lang="en-GB" sz="2800" dirty="0"/>
-              <a:t>Or, use Commute: </a:t>
-            </a:r>
-            <a:r>
-              <a:rPr lang="en-GB" sz="2800" dirty="0">
-                <a:latin typeface="APL385 Unicode" panose="020B0709000202000203" pitchFamily="49" charset="0"/>
-              </a:rPr>
-              <a:t>2*⍨</a:t>
-            </a:r>
-            <a:r>
-              <a:rPr lang="en-GB" sz="2800" dirty="0"/>
-              <a:t>...</a:t>
-            </a:r>
-          </a:p>
-          <a:p>
-            <a:r>
-              <a:rPr lang="en-GB" sz="2800" dirty="0"/>
-              <a:t>N.B. game of life has no parentheses, partly because (some) primitives (e.g. Residue) were carefully designed to be most useful with a simple constant on the </a:t>
-            </a:r>
-            <a:r>
-              <a:rPr lang="en-GB" sz="2800" i="1" dirty="0"/>
-              <a:t>left</a:t>
-            </a:r>
-            <a:r>
-              <a:rPr lang="en-GB" sz="2800" dirty="0"/>
-              <a:t>.</a:t>
-            </a:r>
-          </a:p>
-          <a:p>
-            <a:endParaRPr lang="en-GB" sz="2800" dirty="0"/>
+            <a:pPr marL="0" indent="0">
+              <a:buNone/>
+            </a:pPr>
+            <a:r>
+              <a:rPr lang="da-DK" sz="2400" dirty="0"/>
+              <a:t>What does this function do?</a:t>
+            </a:r>
+          </a:p>
+          <a:p>
+            <a:pPr marL="0" indent="0">
+              <a:buNone/>
+            </a:pPr>
+            <a:endParaRPr lang="en-GB" sz="2400" dirty="0"/>
+          </a:p>
+          <a:p>
+            <a:pPr marL="0" indent="0">
+              <a:buNone/>
+            </a:pPr>
+            <a:r>
+              <a:rPr lang="en-GB" sz="2400" dirty="0">
+                <a:latin typeface="APL385 Unicode" panose="020B0709000202000203" pitchFamily="49" charset="0"/>
+              </a:rPr>
+              <a:t>	{(~R∊R∘.×R)/R←1↓⍳⍵}</a:t>
+            </a:r>
+          </a:p>
+          <a:p>
+            <a:pPr marL="0" indent="0">
+              <a:buNone/>
+            </a:pPr>
+            <a:endParaRPr lang="da-DK" sz="1600" dirty="0"/>
+          </a:p>
+          <a:p>
+            <a:pPr marL="0" indent="0">
+              <a:buNone/>
+            </a:pPr>
+            <a:r>
+              <a:rPr lang="da-DK" sz="2400" dirty="0"/>
+              <a:t>Or:</a:t>
+            </a:r>
+            <a:endParaRPr lang="en-GB" sz="2400" dirty="0"/>
+          </a:p>
+          <a:p>
+            <a:pPr marL="0" indent="0">
+              <a:buNone/>
+            </a:pPr>
+            <a:r>
+              <a:rPr lang="en-GB" sz="2400" dirty="0">
+                <a:latin typeface="APL385 Unicode" panose="020B0709000202000203" pitchFamily="49" charset="0"/>
+              </a:rPr>
+              <a:t>	{{(~⍵∊⍵∘.×⍵)/⍵}1↓⍳⍵}</a:t>
+            </a:r>
           </a:p>
         </p:txBody>
       </p:sp>
     </p:spTree>
     <p:extLst>
       <p:ext uri="{BB962C8B-B14F-4D97-AF65-F5344CB8AC3E}">
-        <p14:creationId xmlns:p14="http://schemas.microsoft.com/office/powerpoint/2010/main" val="4082523071"/>
+        <p14:creationId xmlns:p14="http://schemas.microsoft.com/office/powerpoint/2010/main" val="440400977"/>
       </p:ext>
     </p:extLst>
   </p:cSld>
@@ -3635,127 +3675,6 @@
         </p:nvSpPr>
         <p:spPr/>
         <p:txBody>
-          <a:bodyPr/>
-          <a:lstStyle/>
-          <a:p>
-            <a:r>
-              <a:rPr lang="en-US" dirty="0"/>
-              <a:t>Reading APL</a:t>
-            </a:r>
-          </a:p>
-        </p:txBody>
-      </p:sp>
-      <p:sp>
-        <p:nvSpPr>
-          <p:cNvPr id="4" name="Text Placeholder 3"/>
-          <p:cNvSpPr>
-            <a:spLocks noGrp="1"/>
-          </p:cNvSpPr>
-          <p:nvPr>
-            <p:ph type="body" sz="quarter" idx="11"/>
-          </p:nvPr>
-        </p:nvSpPr>
-        <p:spPr/>
-        <p:txBody>
-          <a:bodyPr/>
-          <a:lstStyle/>
-          <a:p>
-            <a:pPr marL="0" indent="0">
-              <a:buNone/>
-            </a:pPr>
-            <a:r>
-              <a:rPr lang="da-DK" sz="2400" dirty="0"/>
-              <a:t>What does this function do?</a:t>
-            </a:r>
-          </a:p>
-          <a:p>
-            <a:pPr marL="0" indent="0">
-              <a:buNone/>
-            </a:pPr>
-            <a:endParaRPr lang="en-GB" sz="2400" dirty="0"/>
-          </a:p>
-          <a:p>
-            <a:pPr marL="0" indent="0">
-              <a:buNone/>
-            </a:pPr>
-            <a:r>
-              <a:rPr lang="en-GB" sz="2400" dirty="0">
-                <a:latin typeface="APL385 Unicode" panose="020B0709000202000203" pitchFamily="49" charset="0"/>
-              </a:rPr>
-              <a:t>	{(~R∊R∘.×R)/R←1↓⍳⍵}</a:t>
-            </a:r>
-          </a:p>
-          <a:p>
-            <a:pPr marL="0" indent="0">
-              <a:buNone/>
-            </a:pPr>
-            <a:endParaRPr lang="da-DK" sz="1600" dirty="0"/>
-          </a:p>
-          <a:p>
-            <a:pPr marL="0" indent="0">
-              <a:buNone/>
-            </a:pPr>
-            <a:r>
-              <a:rPr lang="da-DK" sz="2400" dirty="0"/>
-              <a:t>Or:</a:t>
-            </a:r>
-            <a:endParaRPr lang="en-GB" sz="2400" dirty="0"/>
-          </a:p>
-          <a:p>
-            <a:pPr marL="0" indent="0">
-              <a:buNone/>
-            </a:pPr>
-            <a:r>
-              <a:rPr lang="en-GB" sz="2400" dirty="0">
-                <a:latin typeface="APL385 Unicode" panose="020B0709000202000203" pitchFamily="49" charset="0"/>
-              </a:rPr>
-              <a:t>	{{(~⍵∊⍵∘.×⍵)/⍵}1↓⍳⍵}</a:t>
-            </a:r>
-          </a:p>
-        </p:txBody>
-      </p:sp>
-    </p:spTree>
-    <p:extLst>
-      <p:ext uri="{BB962C8B-B14F-4D97-AF65-F5344CB8AC3E}">
-        <p14:creationId xmlns:p14="http://schemas.microsoft.com/office/powerpoint/2010/main" val="440400977"/>
-      </p:ext>
-    </p:extLst>
-  </p:cSld>
-  <p:clrMapOvr>
-    <a:masterClrMapping/>
-  </p:clrMapOvr>
-</p:sld>
-</file>
-
-<file path=ppt/slides/slide16.xml><?xml version="1.0" encoding="utf-8"?>
-<p:sld xmlns:a="http://schemas.openxmlformats.org/drawingml/2006/main" xmlns:r="http://schemas.openxmlformats.org/officeDocument/2006/relationships" xmlns:p="http://schemas.openxmlformats.org/presentationml/2006/main">
-  <p:cSld>
-    <p:spTree>
-      <p:nvGrpSpPr>
-        <p:cNvPr id="1" name=""/>
-        <p:cNvGrpSpPr/>
-        <p:nvPr/>
-      </p:nvGrpSpPr>
-      <p:grpSpPr>
-        <a:xfrm>
-          <a:off x="0" y="0"/>
-          <a:ext cx="0" cy="0"/>
-          <a:chOff x="0" y="0"/>
-          <a:chExt cx="0" cy="0"/>
-        </a:xfrm>
-      </p:grpSpPr>
-      <p:sp>
-        <p:nvSpPr>
-          <p:cNvPr id="3" name="Title 2"/>
-          <p:cNvSpPr>
-            <a:spLocks noGrp="1"/>
-          </p:cNvSpPr>
-          <p:nvPr>
-            <p:ph type="title"/>
-          </p:nvPr>
-        </p:nvSpPr>
-        <p:spPr/>
-        <p:txBody>
           <a:bodyPr>
             <a:normAutofit fontScale="90000"/>
           </a:bodyPr>
@@ -3888,7 +3807,7 @@
 </p:sld>
 </file>
 
-<file path=ppt/slides/slide17.xml><?xml version="1.0" encoding="utf-8"?>
+<file path=ppt/slides/slide16.xml><?xml version="1.0" encoding="utf-8"?>
 <p:sld xmlns:a="http://schemas.openxmlformats.org/drawingml/2006/main" xmlns:r="http://schemas.openxmlformats.org/officeDocument/2006/relationships" xmlns:p="http://schemas.openxmlformats.org/presentationml/2006/main">
   <p:cSld>
     <p:spTree>
@@ -4479,6 +4398,154 @@
 </p:sld>
 </file>
 
+<file path=ppt/slides/slide17.xml><?xml version="1.0" encoding="utf-8"?>
+<p:sld xmlns:a="http://schemas.openxmlformats.org/drawingml/2006/main" xmlns:r="http://schemas.openxmlformats.org/officeDocument/2006/relationships" xmlns:p="http://schemas.openxmlformats.org/presentationml/2006/main">
+  <p:cSld>
+    <p:spTree>
+      <p:nvGrpSpPr>
+        <p:cNvPr id="1" name=""/>
+        <p:cNvGrpSpPr/>
+        <p:nvPr/>
+      </p:nvGrpSpPr>
+      <p:grpSpPr>
+        <a:xfrm>
+          <a:off x="0" y="0"/>
+          <a:ext cx="0" cy="0"/>
+          <a:chOff x="0" y="0"/>
+          <a:chExt cx="0" cy="0"/>
+        </a:xfrm>
+      </p:grpSpPr>
+      <p:sp>
+        <p:nvSpPr>
+          <p:cNvPr id="3" name="Title 2"/>
+          <p:cNvSpPr>
+            <a:spLocks noGrp="1"/>
+          </p:cNvSpPr>
+          <p:nvPr>
+            <p:ph type="title"/>
+          </p:nvPr>
+        </p:nvSpPr>
+        <p:spPr/>
+        <p:txBody>
+          <a:bodyPr/>
+          <a:lstStyle/>
+          <a:p>
+            <a:r>
+              <a:rPr lang="da-DK" dirty="0"/>
+              <a:t>Procedures / Tradfns</a:t>
+            </a:r>
+            <a:endParaRPr lang="en-GB" dirty="0"/>
+          </a:p>
+        </p:txBody>
+      </p:sp>
+      <p:sp>
+        <p:nvSpPr>
+          <p:cNvPr id="4" name="Text Placeholder 3"/>
+          <p:cNvSpPr>
+            <a:spLocks noGrp="1"/>
+          </p:cNvSpPr>
+          <p:nvPr>
+            <p:ph type="body" sz="quarter" idx="11"/>
+          </p:nvPr>
+        </p:nvSpPr>
+        <p:spPr>
+          <a:xfrm>
+            <a:off x="827583" y="1628800"/>
+            <a:ext cx="7632849" cy="1872803"/>
+          </a:xfrm>
+        </p:spPr>
+        <p:txBody>
+          <a:bodyPr>
+            <a:normAutofit fontScale="85000" lnSpcReduction="20000"/>
+          </a:bodyPr>
+          <a:lstStyle/>
+          <a:p>
+            <a:pPr marL="0" indent="0">
+              <a:buNone/>
+            </a:pPr>
+            <a:r>
+              <a:rPr lang="da-DK" sz="2000" b="1" dirty="0"/>
+              <a:t>”Ambi-valent” (+ use a control structure)</a:t>
+            </a:r>
+          </a:p>
+          <a:p>
+            <a:pPr marL="0" indent="0">
+              <a:buNone/>
+            </a:pPr>
+            <a:br>
+              <a:rPr lang="da-DK" sz="2000" dirty="0">
+                <a:latin typeface="APL385 Unicode" panose="020B0709000202000203" pitchFamily="49" charset="0"/>
+              </a:rPr>
+            </a:br>
+            <a:r>
+              <a:rPr lang="da-DK" sz="2000" dirty="0">
+                <a:latin typeface="APL385 Unicode" panose="020B0709000202000203" pitchFamily="49" charset="0"/>
+              </a:rPr>
+              <a:t>     ∇ R←{Window} Sum X                      </a:t>
+            </a:r>
+          </a:p>
+          <a:p>
+            <a:pPr marL="0" indent="0">
+              <a:buNone/>
+            </a:pPr>
+            <a:r>
+              <a:rPr lang="da-DK" sz="2000" dirty="0">
+                <a:latin typeface="APL385 Unicode" panose="020B0709000202000203" pitchFamily="49" charset="0"/>
+              </a:rPr>
+              <a:t>[1]    :If 0=⎕NC 'Window' ⋄ R←+/X</a:t>
+            </a:r>
+            <a:br>
+              <a:rPr lang="da-DK" sz="2000" dirty="0">
+                <a:latin typeface="APL385 Unicode" panose="020B0709000202000203" pitchFamily="49" charset="0"/>
+              </a:rPr>
+            </a:br>
+            <a:r>
+              <a:rPr lang="da-DK" sz="2000" dirty="0">
+                <a:latin typeface="APL385 Unicode" panose="020B0709000202000203" pitchFamily="49" charset="0"/>
+              </a:rPr>
+              <a:t>[2]    :Else ⋄ R←Window +/ X</a:t>
+            </a:r>
+          </a:p>
+          <a:p>
+            <a:pPr marL="0" indent="0">
+              <a:buNone/>
+            </a:pPr>
+            <a:r>
+              <a:rPr lang="da-DK" sz="2000" dirty="0">
+                <a:latin typeface="APL385 Unicode" panose="020B0709000202000203" pitchFamily="49" charset="0"/>
+              </a:rPr>
+              <a:t>[3]    :EndIf                            </a:t>
+            </a:r>
+          </a:p>
+          <a:p>
+            <a:pPr marL="0" indent="0">
+              <a:buNone/>
+            </a:pPr>
+            <a:r>
+              <a:rPr lang="da-DK" sz="2000" dirty="0">
+                <a:latin typeface="APL385 Unicode" panose="020B0709000202000203" pitchFamily="49" charset="0"/>
+              </a:rPr>
+              <a:t>     ∇  </a:t>
+            </a:r>
+            <a:endParaRPr lang="en-GB" sz="2000" dirty="0">
+              <a:latin typeface="APL385 Unicode" panose="020B0709000202000203" pitchFamily="49" charset="0"/>
+            </a:endParaRPr>
+          </a:p>
+        </p:txBody>
+      </p:sp>
+    </p:spTree>
+    <p:extLst>
+      <p:ext uri="{BB962C8B-B14F-4D97-AF65-F5344CB8AC3E}">
+        <p14:creationId xmlns:p14="http://schemas.microsoft.com/office/powerpoint/2010/main" val="116970750"/>
+      </p:ext>
+    </p:extLst>
+  </p:cSld>
+  <p:clrMapOvr>
+    <a:masterClrMapping/>
+  </p:clrMapOvr>
+</p:sld>
+</file>
+
 <file path=ppt/slides/slide18.xml><?xml version="1.0" encoding="utf-8"?>
 <p:sld xmlns:a="http://schemas.openxmlformats.org/drawingml/2006/main" xmlns:r="http://schemas.openxmlformats.org/officeDocument/2006/relationships" xmlns:p="http://schemas.openxmlformats.org/presentationml/2006/main">
   <p:cSld>
@@ -4521,7 +4588,7 @@
       </p:sp>
       <p:sp>
         <p:nvSpPr>
-          <p:cNvPr id="4" name="Text Placeholder 3"/>
+          <p:cNvPr id="6" name="Text Placeholder 5"/>
           <p:cNvSpPr>
             <a:spLocks noGrp="1"/>
           </p:cNvSpPr>
@@ -4531,93 +4598,134 @@
         </p:nvSpPr>
         <p:spPr>
           <a:xfrm>
-            <a:off x="827583" y="1628800"/>
-            <a:ext cx="7632849" cy="1872803"/>
+            <a:off x="827584" y="1592329"/>
+            <a:ext cx="7632849" cy="4321075"/>
           </a:xfrm>
         </p:spPr>
         <p:txBody>
-          <a:bodyPr>
-            <a:normAutofit fontScale="85000" lnSpcReduction="20000"/>
-          </a:bodyPr>
+          <a:bodyPr/>
           <a:lstStyle/>
+          <a:p>
+            <a:pPr marL="0" indent="0">
+              <a:buFontTx/>
+              <a:buNone/>
+            </a:pPr>
+            <a:r>
+              <a:rPr lang="da-DK" sz="1800" b="1" dirty="0"/>
+              <a:t>Name Elements of Right Argument</a:t>
+            </a:r>
+          </a:p>
+          <a:p>
+            <a:pPr marL="0" indent="0">
+              <a:buFontTx/>
+              <a:buNone/>
+            </a:pPr>
+            <a:r>
+              <a:rPr lang="da-DK" sz="1800" b="1" dirty="0"/>
+              <a:t>   + Local Variable</a:t>
+            </a:r>
+          </a:p>
+          <a:p>
+            <a:pPr marL="0" indent="0">
+              <a:buFontTx/>
+              <a:buNone/>
+            </a:pPr>
+            <a:r>
+              <a:rPr lang="da-DK" sz="1800" b="1" dirty="0"/>
+              <a:t>   + Class / DotNet declarations</a:t>
+            </a:r>
+            <a:br>
+              <a:rPr lang="da-DK" sz="1800" b="1" dirty="0"/>
+            </a:br>
+            <a:endParaRPr lang="da-DK" sz="1800" b="1" dirty="0"/>
+          </a:p>
+          <a:p>
+            <a:pPr marL="0" indent="0">
+              <a:buFontTx/>
+              <a:buNone/>
+            </a:pPr>
+            <a:r>
+              <a:rPr lang="da-DK" sz="1800" dirty="0">
+                <a:latin typeface="APL385 Unicode" panose="020B0709000202000203" pitchFamily="49" charset="0"/>
+              </a:rPr>
+              <a:t>    ∇ r←Round(n decimals);base</a:t>
+            </a:r>
+          </a:p>
+          <a:p>
+            <a:pPr marL="0" indent="0">
+              <a:buFontTx/>
+              <a:buNone/>
+            </a:pPr>
+            <a:r>
+              <a:rPr lang="da-DK" sz="1800" dirty="0">
+                <a:latin typeface="APL385 Unicode" panose="020B0709000202000203" pitchFamily="49" charset="0"/>
+              </a:rPr>
+              <a:t>[1]   :Access Public Shared</a:t>
+            </a:r>
+          </a:p>
+          <a:p>
+            <a:pPr marL="0" indent="0">
+              <a:buFontTx/>
+              <a:buNone/>
+            </a:pPr>
+            <a:r>
+              <a:rPr lang="da-DK" sz="1800" dirty="0">
+                <a:latin typeface="APL385 Unicode" panose="020B0709000202000203" pitchFamily="49" charset="0"/>
+              </a:rPr>
+              <a:t>[2]   :Signature Double←Round Double N, Int32 Decimals</a:t>
+            </a:r>
+          </a:p>
+          <a:p>
+            <a:pPr marL="0" indent="0">
+              <a:buFontTx/>
+              <a:buNone/>
+            </a:pPr>
+            <a:r>
+              <a:rPr lang="da-DK" sz="1800" dirty="0">
+                <a:latin typeface="APL385 Unicode" panose="020B0709000202000203" pitchFamily="49" charset="0"/>
+              </a:rPr>
+              <a:t>[3]   base←10*decimals</a:t>
+            </a:r>
+          </a:p>
+          <a:p>
+            <a:pPr marL="0" indent="0">
+              <a:buFontTx/>
+              <a:buNone/>
+            </a:pPr>
+            <a:r>
+              <a:rPr lang="da-DK" sz="1800" dirty="0">
+                <a:latin typeface="APL385 Unicode" panose="020B0709000202000203" pitchFamily="49" charset="0"/>
+              </a:rPr>
+              <a:t>[4]   r←(⌊0.5+n×base)÷base</a:t>
+            </a:r>
+          </a:p>
+          <a:p>
+            <a:pPr marL="0" indent="0">
+              <a:buFontTx/>
+              <a:buNone/>
+            </a:pPr>
+            <a:r>
+              <a:rPr lang="da-DK" sz="1800" dirty="0">
+                <a:latin typeface="APL385 Unicode" panose="020B0709000202000203" pitchFamily="49" charset="0"/>
+              </a:rPr>
+              <a:t>    ∇</a:t>
+            </a:r>
+            <a:endParaRPr lang="en-GB" sz="1800" dirty="0">
+              <a:latin typeface="APL385 Unicode" panose="020B0709000202000203" pitchFamily="49" charset="0"/>
+            </a:endParaRPr>
+          </a:p>
           <a:p>
             <a:pPr marL="0" indent="0">
               <a:buNone/>
             </a:pPr>
-            <a:r>
-              <a:rPr lang="da-DK" sz="2000" b="1" dirty="0"/>
-              <a:t>”Ambi-valent” (+ use a control structure)</a:t>
-            </a:r>
-          </a:p>
-          <a:p>
-            <a:pPr marL="0" indent="0">
-              <a:buNone/>
-            </a:pPr>
-            <a:br>
-              <a:rPr lang="da-DK" sz="2000" dirty="0">
-                <a:latin typeface="APL385 Unicode" panose="020B0709000202000203" pitchFamily="49" charset="0"/>
-              </a:rPr>
-            </a:br>
-            <a:r>
-              <a:rPr lang="da-DK" sz="2000" dirty="0">
-                <a:latin typeface="APL385 Unicode" panose="020B0709000202000203" pitchFamily="49" charset="0"/>
-              </a:rPr>
-              <a:t>     ∇ R←{Window} Sum X                      </a:t>
-            </a:r>
-          </a:p>
-          <a:p>
-            <a:pPr marL="0" indent="0">
-              <a:buNone/>
-            </a:pPr>
-            <a:r>
-              <a:rPr lang="da-DK" sz="2000" dirty="0">
-                <a:latin typeface="APL385 Unicode" panose="020B0709000202000203" pitchFamily="49" charset="0"/>
-              </a:rPr>
-              <a:t>[1]    :If 0=⎕NC 'Window' ⋄ R←+/X</a:t>
-            </a:r>
-            <a:br>
-              <a:rPr lang="da-DK" sz="2000" dirty="0">
-                <a:latin typeface="APL385 Unicode" panose="020B0709000202000203" pitchFamily="49" charset="0"/>
-              </a:rPr>
-            </a:br>
-            <a:r>
-              <a:rPr lang="da-DK" sz="2000" dirty="0">
-                <a:latin typeface="APL385 Unicode" panose="020B0709000202000203" pitchFamily="49" charset="0"/>
-              </a:rPr>
-              <a:t>[2]    :Else ⋄ R←Window +/ X</a:t>
-            </a:r>
-          </a:p>
-          <a:p>
-            <a:pPr marL="0" indent="0">
-              <a:buNone/>
-            </a:pPr>
-            <a:r>
-              <a:rPr lang="da-DK" sz="2000" dirty="0">
-                <a:latin typeface="APL385 Unicode" panose="020B0709000202000203" pitchFamily="49" charset="0"/>
-              </a:rPr>
-              <a:t>[3]    :EndIf                            </a:t>
-            </a:r>
-          </a:p>
-          <a:p>
-            <a:pPr marL="0" indent="0">
-              <a:buNone/>
-            </a:pPr>
-            <a:r>
-              <a:rPr lang="da-DK" sz="2000" dirty="0">
-                <a:latin typeface="APL385 Unicode" panose="020B0709000202000203" pitchFamily="49" charset="0"/>
-              </a:rPr>
-              <a:t>     ∇  </a:t>
-            </a:r>
-            <a:endParaRPr lang="en-GB" sz="2000" dirty="0">
-              <a:latin typeface="APL385 Unicode" panose="020B0709000202000203" pitchFamily="49" charset="0"/>
-            </a:endParaRPr>
+            <a:endParaRPr lang="en-GB" sz="1800" dirty="0"/>
           </a:p>
         </p:txBody>
       </p:sp>
     </p:spTree>
     <p:extLst>
       <p:ext uri="{BB962C8B-B14F-4D97-AF65-F5344CB8AC3E}">
-        <p14:creationId xmlns:p14="http://schemas.microsoft.com/office/powerpoint/2010/main" val="116970750"/>
+        <p14:creationId xmlns:p14="http://schemas.microsoft.com/office/powerpoint/2010/main" val="3045991241"/>
       </p:ext>
     </p:extLst>
   </p:cSld>
@@ -4661,7 +4769,7 @@
           <a:p>
             <a:r>
               <a:rPr lang="da-DK" dirty="0"/>
-              <a:t>Procedures / Tradfns</a:t>
+              <a:t>Errors</a:t>
             </a:r>
             <a:endParaRPr lang="en-GB" dirty="0"/>
           </a:p>
@@ -4669,7 +4777,7 @@
       </p:sp>
       <p:sp>
         <p:nvSpPr>
-          <p:cNvPr id="6" name="Text Placeholder 5"/>
+          <p:cNvPr id="4" name="Text Placeholder 3"/>
           <p:cNvSpPr>
             <a:spLocks noGrp="1"/>
           </p:cNvSpPr>
@@ -4677,136 +4785,176 @@
             <p:ph type="body" sz="quarter" idx="11"/>
           </p:nvPr>
         </p:nvSpPr>
-        <p:spPr>
-          <a:xfrm>
-            <a:off x="827584" y="1592329"/>
-            <a:ext cx="7632849" cy="4321075"/>
-          </a:xfrm>
-        </p:spPr>
+        <p:spPr/>
         <p:txBody>
           <a:bodyPr/>
           <a:lstStyle/>
-          <a:p>
-            <a:pPr marL="0" indent="0">
-              <a:buFontTx/>
-              <a:buNone/>
-            </a:pPr>
-            <a:r>
-              <a:rPr lang="da-DK" sz="1800" b="1" dirty="0"/>
-              <a:t>Name Elements of Right Argument</a:t>
-            </a:r>
-          </a:p>
-          <a:p>
-            <a:pPr marL="0" indent="0">
-              <a:buFontTx/>
-              <a:buNone/>
-            </a:pPr>
-            <a:r>
-              <a:rPr lang="da-DK" sz="1800" b="1" dirty="0"/>
-              <a:t>   + Local Variable</a:t>
-            </a:r>
-          </a:p>
-          <a:p>
-            <a:pPr marL="0" indent="0">
-              <a:buFontTx/>
-              <a:buNone/>
-            </a:pPr>
-            <a:r>
-              <a:rPr lang="da-DK" sz="1800" b="1" dirty="0"/>
-              <a:t>   + Class / DotNet declarations</a:t>
-            </a:r>
-            <a:br>
-              <a:rPr lang="da-DK" sz="1800" b="1" dirty="0"/>
-            </a:br>
-            <a:endParaRPr lang="da-DK" sz="1800" b="1" dirty="0"/>
-          </a:p>
-          <a:p>
-            <a:pPr marL="0" indent="0">
-              <a:buFontTx/>
-              <a:buNone/>
-            </a:pPr>
-            <a:r>
-              <a:rPr lang="da-DK" sz="1800" dirty="0">
-                <a:latin typeface="APL385 Unicode" panose="020B0709000202000203" pitchFamily="49" charset="0"/>
-              </a:rPr>
-              <a:t>    ∇ r←Round(n decimals);base</a:t>
-            </a:r>
-          </a:p>
-          <a:p>
-            <a:pPr marL="0" indent="0">
-              <a:buFontTx/>
-              <a:buNone/>
-            </a:pPr>
-            <a:r>
-              <a:rPr lang="da-DK" sz="1800" dirty="0">
-                <a:latin typeface="APL385 Unicode" panose="020B0709000202000203" pitchFamily="49" charset="0"/>
-              </a:rPr>
-              <a:t>[1]   :Access Public Shared</a:t>
-            </a:r>
-          </a:p>
-          <a:p>
-            <a:pPr marL="0" indent="0">
-              <a:buFontTx/>
-              <a:buNone/>
-            </a:pPr>
-            <a:r>
-              <a:rPr lang="da-DK" sz="1800" dirty="0">
-                <a:latin typeface="APL385 Unicode" panose="020B0709000202000203" pitchFamily="49" charset="0"/>
-              </a:rPr>
-              <a:t>[2]   :Signature Double←Round Double N, Int32 Decimals</a:t>
-            </a:r>
-          </a:p>
-          <a:p>
-            <a:pPr marL="0" indent="0">
-              <a:buFontTx/>
-              <a:buNone/>
-            </a:pPr>
-            <a:r>
-              <a:rPr lang="da-DK" sz="1800" dirty="0">
-                <a:latin typeface="APL385 Unicode" panose="020B0709000202000203" pitchFamily="49" charset="0"/>
-              </a:rPr>
-              <a:t>[3]   base←10*decimals</a:t>
-            </a:r>
-          </a:p>
-          <a:p>
-            <a:pPr marL="0" indent="0">
-              <a:buFontTx/>
-              <a:buNone/>
-            </a:pPr>
-            <a:r>
-              <a:rPr lang="da-DK" sz="1800" dirty="0">
-                <a:latin typeface="APL385 Unicode" panose="020B0709000202000203" pitchFamily="49" charset="0"/>
-              </a:rPr>
-              <a:t>[4]   r←(⌊0.5+n×base)÷base</a:t>
-            </a:r>
-          </a:p>
-          <a:p>
-            <a:pPr marL="0" indent="0">
-              <a:buFontTx/>
-              <a:buNone/>
-            </a:pPr>
-            <a:r>
-              <a:rPr lang="da-DK" sz="1800" dirty="0">
-                <a:latin typeface="APL385 Unicode" panose="020B0709000202000203" pitchFamily="49" charset="0"/>
-              </a:rPr>
-              <a:t>    ∇</a:t>
-            </a:r>
-            <a:endParaRPr lang="en-GB" sz="1800" dirty="0">
-              <a:latin typeface="APL385 Unicode" panose="020B0709000202000203" pitchFamily="49" charset="0"/>
-            </a:endParaRPr>
-          </a:p>
           <a:p>
             <a:pPr marL="0" indent="0">
               <a:buNone/>
             </a:pPr>
-            <a:endParaRPr lang="en-GB" sz="1800" dirty="0"/>
+            <a:r>
+              <a:rPr lang="en-GB" sz="1800" dirty="0">
+                <a:latin typeface="APL385 Unicode" panose="020B0709000202000203" pitchFamily="49" charset="0"/>
+              </a:rPr>
+              <a:t>      1 2 3÷4 5</a:t>
+            </a:r>
+            <a:br>
+              <a:rPr lang="en-GB" sz="1800" dirty="0">
+                <a:latin typeface="APL385 Unicode" panose="020B0709000202000203" pitchFamily="49" charset="0"/>
+              </a:rPr>
+            </a:br>
+            <a:r>
+              <a:rPr lang="en-GB" sz="1800" dirty="0">
+                <a:latin typeface="APL385 Unicode" panose="020B0709000202000203" pitchFamily="49" charset="0"/>
+              </a:rPr>
+              <a:t>LENGTH ERROR</a:t>
+            </a:r>
+            <a:br>
+              <a:rPr lang="en-GB" sz="1800" dirty="0">
+                <a:latin typeface="APL385 Unicode" panose="020B0709000202000203" pitchFamily="49" charset="0"/>
+              </a:rPr>
+            </a:br>
+            <a:r>
+              <a:rPr lang="en-GB" sz="1800" dirty="0">
+                <a:latin typeface="APL385 Unicode" panose="020B0709000202000203" pitchFamily="49" charset="0"/>
+              </a:rPr>
+              <a:t>      1 2 3÷4 5</a:t>
+            </a:r>
+            <a:br>
+              <a:rPr lang="en-GB" sz="1800" dirty="0">
+                <a:latin typeface="APL385 Unicode" panose="020B0709000202000203" pitchFamily="49" charset="0"/>
+              </a:rPr>
+            </a:br>
+            <a:r>
+              <a:rPr lang="en-GB" sz="1800" dirty="0">
+                <a:latin typeface="APL385 Unicode" panose="020B0709000202000203" pitchFamily="49" charset="0"/>
+              </a:rPr>
+              <a:t>     ∧</a:t>
+            </a:r>
+          </a:p>
+          <a:p>
+            <a:pPr marL="0" indent="0">
+              <a:buNone/>
+            </a:pPr>
+            <a:r>
+              <a:rPr lang="en-GB" sz="1800" dirty="0">
+                <a:latin typeface="APL385 Unicode" panose="020B0709000202000203" pitchFamily="49" charset="0"/>
+              </a:rPr>
+              <a:t>      ⎕EN </a:t>
+            </a:r>
+            <a:br>
+              <a:rPr lang="en-GB" sz="1800" dirty="0">
+                <a:latin typeface="APL385 Unicode" panose="020B0709000202000203" pitchFamily="49" charset="0"/>
+              </a:rPr>
+            </a:br>
+            <a:r>
+              <a:rPr lang="en-GB" sz="1800" dirty="0">
+                <a:latin typeface="APL385 Unicode" panose="020B0709000202000203" pitchFamily="49" charset="0"/>
+              </a:rPr>
+              <a:t>5</a:t>
+            </a:r>
+          </a:p>
+          <a:p>
+            <a:pPr marL="0" indent="0">
+              <a:buNone/>
+            </a:pPr>
+            <a:r>
+              <a:rPr lang="en-GB" sz="1800" dirty="0">
+                <a:latin typeface="APL385 Unicode" panose="020B0709000202000203" pitchFamily="49" charset="0"/>
+              </a:rPr>
+              <a:t>      1÷0</a:t>
+            </a:r>
+            <a:br>
+              <a:rPr lang="en-GB" sz="1800" dirty="0">
+                <a:latin typeface="APL385 Unicode" panose="020B0709000202000203" pitchFamily="49" charset="0"/>
+              </a:rPr>
+            </a:br>
+            <a:r>
+              <a:rPr lang="en-GB" sz="1800" dirty="0">
+                <a:latin typeface="APL385 Unicode" panose="020B0709000202000203" pitchFamily="49" charset="0"/>
+              </a:rPr>
+              <a:t>DOMAIN ERROR: Divide by zero</a:t>
+            </a:r>
+            <a:br>
+              <a:rPr lang="en-GB" sz="1800" dirty="0">
+                <a:latin typeface="APL385 Unicode" panose="020B0709000202000203" pitchFamily="49" charset="0"/>
+              </a:rPr>
+            </a:br>
+            <a:r>
+              <a:rPr lang="en-GB" sz="1800" dirty="0">
+                <a:latin typeface="APL385 Unicode" panose="020B0709000202000203" pitchFamily="49" charset="0"/>
+              </a:rPr>
+              <a:t>      1÷0</a:t>
+            </a:r>
+            <a:br>
+              <a:rPr lang="en-GB" sz="1800" dirty="0">
+                <a:latin typeface="APL385 Unicode" panose="020B0709000202000203" pitchFamily="49" charset="0"/>
+              </a:rPr>
+            </a:br>
+            <a:r>
+              <a:rPr lang="en-GB" sz="1800" dirty="0">
+                <a:latin typeface="APL385 Unicode" panose="020B0709000202000203" pitchFamily="49" charset="0"/>
+              </a:rPr>
+              <a:t>     ∧</a:t>
+            </a:r>
+          </a:p>
+          <a:p>
+            <a:pPr marL="0" indent="0">
+              <a:buNone/>
+            </a:pPr>
+            <a:r>
+              <a:rPr lang="en-GB" sz="1800" dirty="0">
+                <a:latin typeface="APL385 Unicode" panose="020B0709000202000203" pitchFamily="49" charset="0"/>
+              </a:rPr>
+              <a:t>      ⎕EN (⎕EM 11)</a:t>
+            </a:r>
+          </a:p>
+          <a:p>
+            <a:pPr marL="0" indent="0">
+              <a:buNone/>
+            </a:pPr>
+            <a:r>
+              <a:rPr lang="en-GB" sz="1800" dirty="0">
+                <a:latin typeface="APL385 Unicode" panose="020B0709000202000203" pitchFamily="49" charset="0"/>
+              </a:rPr>
+              <a:t> 11  DOMAIN ERROR</a:t>
+            </a:r>
+          </a:p>
+          <a:p>
+            <a:pPr marL="0" indent="0">
+              <a:buNone/>
+            </a:pPr>
+            <a:r>
+              <a:rPr lang="en-GB" sz="1800" dirty="0">
+                <a:latin typeface="APL385 Unicode" panose="020B0709000202000203" pitchFamily="49" charset="0"/>
+              </a:rPr>
+              <a:t>      ⎕</a:t>
+            </a:r>
+            <a:r>
+              <a:rPr lang="en-GB" sz="1800" dirty="0" err="1">
+                <a:latin typeface="APL385 Unicode" panose="020B0709000202000203" pitchFamily="49" charset="0"/>
+              </a:rPr>
+              <a:t>DMX.Message</a:t>
+            </a:r>
+            <a:br>
+              <a:rPr lang="en-GB" sz="1800" dirty="0">
+                <a:latin typeface="APL385 Unicode" panose="020B0709000202000203" pitchFamily="49" charset="0"/>
+              </a:rPr>
+            </a:br>
+            <a:r>
+              <a:rPr lang="en-GB" sz="1800" dirty="0">
+                <a:latin typeface="APL385 Unicode" panose="020B0709000202000203" pitchFamily="49" charset="0"/>
+              </a:rPr>
+              <a:t>Divide by zero</a:t>
+            </a:r>
           </a:p>
         </p:txBody>
       </p:sp>
     </p:spTree>
     <p:extLst>
       <p:ext uri="{BB962C8B-B14F-4D97-AF65-F5344CB8AC3E}">
-        <p14:creationId xmlns:p14="http://schemas.microsoft.com/office/powerpoint/2010/main" val="3045991241"/>
+        <p14:creationId xmlns:p14="http://schemas.microsoft.com/office/powerpoint/2010/main" val="1541632670"/>
       </p:ext>
     </p:extLst>
   </p:cSld>
@@ -5064,235 +5212,6 @@
 </file>
 
 <file path=ppt/slides/slide20.xml><?xml version="1.0" encoding="utf-8"?>
-<p:sld xmlns:a="http://schemas.openxmlformats.org/drawingml/2006/main" xmlns:r="http://schemas.openxmlformats.org/officeDocument/2006/relationships" xmlns:p="http://schemas.openxmlformats.org/presentationml/2006/main">
-  <p:cSld>
-    <p:spTree>
-      <p:nvGrpSpPr>
-        <p:cNvPr id="1" name=""/>
-        <p:cNvGrpSpPr/>
-        <p:nvPr/>
-      </p:nvGrpSpPr>
-      <p:grpSpPr>
-        <a:xfrm>
-          <a:off x="0" y="0"/>
-          <a:ext cx="0" cy="0"/>
-          <a:chOff x="0" y="0"/>
-          <a:chExt cx="0" cy="0"/>
-        </a:xfrm>
-      </p:grpSpPr>
-      <p:sp>
-        <p:nvSpPr>
-          <p:cNvPr id="3" name="Title 2"/>
-          <p:cNvSpPr>
-            <a:spLocks noGrp="1"/>
-          </p:cNvSpPr>
-          <p:nvPr>
-            <p:ph type="title"/>
-          </p:nvPr>
-        </p:nvSpPr>
-        <p:spPr/>
-        <p:txBody>
-          <a:bodyPr/>
-          <a:lstStyle/>
-          <a:p>
-            <a:r>
-              <a:rPr lang="da-DK" dirty="0"/>
-              <a:t>Errors</a:t>
-            </a:r>
-            <a:endParaRPr lang="en-GB" dirty="0"/>
-          </a:p>
-        </p:txBody>
-      </p:sp>
-      <p:sp>
-        <p:nvSpPr>
-          <p:cNvPr id="4" name="Text Placeholder 3"/>
-          <p:cNvSpPr>
-            <a:spLocks noGrp="1"/>
-          </p:cNvSpPr>
-          <p:nvPr>
-            <p:ph type="body" sz="quarter" idx="11"/>
-          </p:nvPr>
-        </p:nvSpPr>
-        <p:spPr/>
-        <p:txBody>
-          <a:bodyPr/>
-          <a:lstStyle/>
-          <a:p>
-            <a:pPr marL="0" indent="0">
-              <a:buNone/>
-            </a:pPr>
-            <a:r>
-              <a:rPr lang="en-GB" sz="1800" dirty="0">
-                <a:latin typeface="APL385 Unicode" panose="020B0709000202000203" pitchFamily="49" charset="0"/>
-              </a:rPr>
-              <a:t>      1 2 3÷4 5</a:t>
-            </a:r>
-            <a:br>
-              <a:rPr lang="en-GB" sz="1800" dirty="0">
-                <a:latin typeface="APL385 Unicode" panose="020B0709000202000203" pitchFamily="49" charset="0"/>
-              </a:rPr>
-            </a:br>
-            <a:r>
-              <a:rPr lang="en-GB" sz="1800" dirty="0">
-                <a:latin typeface="APL385 Unicode" panose="020B0709000202000203" pitchFamily="49" charset="0"/>
-              </a:rPr>
-              <a:t>LENGTH ERROR</a:t>
-            </a:r>
-            <a:br>
-              <a:rPr lang="en-GB" sz="1800" dirty="0">
-                <a:latin typeface="APL385 Unicode" panose="020B0709000202000203" pitchFamily="49" charset="0"/>
-              </a:rPr>
-            </a:br>
-            <a:r>
-              <a:rPr lang="en-GB" sz="1800" dirty="0">
-                <a:latin typeface="APL385 Unicode" panose="020B0709000202000203" pitchFamily="49" charset="0"/>
-              </a:rPr>
-              <a:t>      1 2 3÷4 5</a:t>
-            </a:r>
-            <a:br>
-              <a:rPr lang="en-GB" sz="1800" dirty="0">
-                <a:latin typeface="APL385 Unicode" panose="020B0709000202000203" pitchFamily="49" charset="0"/>
-              </a:rPr>
-            </a:br>
-            <a:r>
-              <a:rPr lang="en-GB" sz="1800" dirty="0">
-                <a:latin typeface="APL385 Unicode" panose="020B0709000202000203" pitchFamily="49" charset="0"/>
-              </a:rPr>
-              <a:t>     ∧</a:t>
-            </a:r>
-          </a:p>
-          <a:p>
-            <a:pPr marL="0" indent="0">
-              <a:buNone/>
-            </a:pPr>
-            <a:r>
-              <a:rPr lang="en-GB" sz="1800" dirty="0">
-                <a:latin typeface="APL385 Unicode" panose="020B0709000202000203" pitchFamily="49" charset="0"/>
-              </a:rPr>
-              <a:t>      ⎕EN </a:t>
-            </a:r>
-            <a:br>
-              <a:rPr lang="en-GB" sz="1800" dirty="0">
-                <a:latin typeface="APL385 Unicode" panose="020B0709000202000203" pitchFamily="49" charset="0"/>
-              </a:rPr>
-            </a:br>
-            <a:r>
-              <a:rPr lang="en-GB" sz="1800" dirty="0">
-                <a:latin typeface="APL385 Unicode" panose="020B0709000202000203" pitchFamily="49" charset="0"/>
-              </a:rPr>
-              <a:t>5</a:t>
-            </a:r>
-          </a:p>
-          <a:p>
-            <a:pPr marL="0" indent="0">
-              <a:buNone/>
-            </a:pPr>
-            <a:r>
-              <a:rPr lang="en-GB" sz="1800" dirty="0">
-                <a:latin typeface="APL385 Unicode" panose="020B0709000202000203" pitchFamily="49" charset="0"/>
-              </a:rPr>
-              <a:t>      1÷0</a:t>
-            </a:r>
-            <a:br>
-              <a:rPr lang="en-GB" sz="1800" dirty="0">
-                <a:latin typeface="APL385 Unicode" panose="020B0709000202000203" pitchFamily="49" charset="0"/>
-              </a:rPr>
-            </a:br>
-            <a:r>
-              <a:rPr lang="en-GB" sz="1800" dirty="0">
-                <a:latin typeface="APL385 Unicode" panose="020B0709000202000203" pitchFamily="49" charset="0"/>
-              </a:rPr>
-              <a:t>DOMAIN ERROR: Divide by zero</a:t>
-            </a:r>
-            <a:br>
-              <a:rPr lang="en-GB" sz="1800" dirty="0">
-                <a:latin typeface="APL385 Unicode" panose="020B0709000202000203" pitchFamily="49" charset="0"/>
-              </a:rPr>
-            </a:br>
-            <a:r>
-              <a:rPr lang="en-GB" sz="1800" dirty="0">
-                <a:latin typeface="APL385 Unicode" panose="020B0709000202000203" pitchFamily="49" charset="0"/>
-              </a:rPr>
-              <a:t>      1÷0</a:t>
-            </a:r>
-            <a:br>
-              <a:rPr lang="en-GB" sz="1800" dirty="0">
-                <a:latin typeface="APL385 Unicode" panose="020B0709000202000203" pitchFamily="49" charset="0"/>
-              </a:rPr>
-            </a:br>
-            <a:r>
-              <a:rPr lang="en-GB" sz="1800" dirty="0">
-                <a:latin typeface="APL385 Unicode" panose="020B0709000202000203" pitchFamily="49" charset="0"/>
-              </a:rPr>
-              <a:t>     ∧</a:t>
-            </a:r>
-          </a:p>
-          <a:p>
-            <a:pPr marL="0" indent="0">
-              <a:buNone/>
-            </a:pPr>
-            <a:r>
-              <a:rPr lang="en-GB" sz="1800" dirty="0">
-                <a:latin typeface="APL385 Unicode" panose="020B0709000202000203" pitchFamily="49" charset="0"/>
-              </a:rPr>
-              <a:t>      ⎕EN (⎕EM 11)</a:t>
-            </a:r>
-          </a:p>
-          <a:p>
-            <a:pPr marL="0" indent="0">
-              <a:buNone/>
-            </a:pPr>
-            <a:r>
-              <a:rPr lang="en-GB" sz="1800" dirty="0">
-                <a:latin typeface="APL385 Unicode" panose="020B0709000202000203" pitchFamily="49" charset="0"/>
-              </a:rPr>
-              <a:t> 11  DOMAIN ERROR</a:t>
-            </a:r>
-          </a:p>
-          <a:p>
-            <a:pPr marL="0" indent="0">
-              <a:buNone/>
-            </a:pPr>
-            <a:r>
-              <a:rPr lang="en-GB" sz="1800" dirty="0">
-                <a:latin typeface="APL385 Unicode" panose="020B0709000202000203" pitchFamily="49" charset="0"/>
-              </a:rPr>
-              <a:t>      ⎕</a:t>
-            </a:r>
-            <a:r>
-              <a:rPr lang="en-GB" sz="1800" dirty="0" err="1">
-                <a:latin typeface="APL385 Unicode" panose="020B0709000202000203" pitchFamily="49" charset="0"/>
-              </a:rPr>
-              <a:t>DMX.Message</a:t>
-            </a:r>
-            <a:br>
-              <a:rPr lang="en-GB" sz="1800" dirty="0">
-                <a:latin typeface="APL385 Unicode" panose="020B0709000202000203" pitchFamily="49" charset="0"/>
-              </a:rPr>
-            </a:br>
-            <a:r>
-              <a:rPr lang="en-GB" sz="1800" dirty="0">
-                <a:latin typeface="APL385 Unicode" panose="020B0709000202000203" pitchFamily="49" charset="0"/>
-              </a:rPr>
-              <a:t>Divide by zero</a:t>
-            </a:r>
-          </a:p>
-        </p:txBody>
-      </p:sp>
-    </p:spTree>
-    <p:extLst>
-      <p:ext uri="{BB962C8B-B14F-4D97-AF65-F5344CB8AC3E}">
-        <p14:creationId xmlns:p14="http://schemas.microsoft.com/office/powerpoint/2010/main" val="1541632670"/>
-      </p:ext>
-    </p:extLst>
-  </p:cSld>
-  <p:clrMapOvr>
-    <a:masterClrMapping/>
-  </p:clrMapOvr>
-</p:sld>
-</file>
-
-<file path=ppt/slides/slide21.xml><?xml version="1.0" encoding="utf-8"?>
 <p:sld xmlns:a="http://schemas.openxmlformats.org/drawingml/2006/main" xmlns:r="http://schemas.openxmlformats.org/officeDocument/2006/relationships" xmlns:p="http://schemas.openxmlformats.org/presentationml/2006/main">
   <p:cSld>
     <p:spTree>
@@ -5947,6 +5866,161 @@
 </p:sld>
 </file>
 
+<file path=ppt/slides/slide21.xml><?xml version="1.0" encoding="utf-8"?>
+<p:sld xmlns:a="http://schemas.openxmlformats.org/drawingml/2006/main" xmlns:r="http://schemas.openxmlformats.org/officeDocument/2006/relationships" xmlns:p="http://schemas.openxmlformats.org/presentationml/2006/main">
+  <p:cSld>
+    <p:spTree>
+      <p:nvGrpSpPr>
+        <p:cNvPr id="1" name=""/>
+        <p:cNvGrpSpPr/>
+        <p:nvPr/>
+      </p:nvGrpSpPr>
+      <p:grpSpPr>
+        <a:xfrm>
+          <a:off x="0" y="0"/>
+          <a:ext cx="0" cy="0"/>
+          <a:chOff x="0" y="0"/>
+          <a:chExt cx="0" cy="0"/>
+        </a:xfrm>
+      </p:grpSpPr>
+      <p:sp>
+        <p:nvSpPr>
+          <p:cNvPr id="3" name="Title 2"/>
+          <p:cNvSpPr>
+            <a:spLocks noGrp="1"/>
+          </p:cNvSpPr>
+          <p:nvPr>
+            <p:ph type="title"/>
+          </p:nvPr>
+        </p:nvSpPr>
+        <p:spPr/>
+        <p:txBody>
+          <a:bodyPr/>
+          <a:lstStyle/>
+          <a:p>
+            <a:r>
+              <a:rPr lang="en-US" dirty="0"/>
+              <a:t>Error Trapping: </a:t>
+            </a:r>
+            <a:r>
+              <a:rPr lang="en-US" dirty="0" err="1"/>
+              <a:t>Dfns</a:t>
+            </a:r>
+            <a:endParaRPr lang="en-US" dirty="0"/>
+          </a:p>
+        </p:txBody>
+      </p:sp>
+      <p:sp>
+        <p:nvSpPr>
+          <p:cNvPr id="4" name="Text Placeholder 3"/>
+          <p:cNvSpPr>
+            <a:spLocks noGrp="1"/>
+          </p:cNvSpPr>
+          <p:nvPr>
+            <p:ph type="body" sz="quarter" idx="11"/>
+          </p:nvPr>
+        </p:nvSpPr>
+        <p:spPr/>
+        <p:txBody>
+          <a:bodyPr/>
+          <a:lstStyle/>
+          <a:p>
+            <a:pPr marL="0" indent="0">
+              <a:buNone/>
+            </a:pPr>
+            <a:r>
+              <a:rPr lang="en-GB" sz="2000" dirty="0">
+                <a:latin typeface="APL385 Unicode" panose="020B0709000202000203" pitchFamily="49" charset="0"/>
+              </a:rPr>
+              <a:t>div←{0::'Something Else is Wrong' </a:t>
+            </a:r>
+            <a:br>
+              <a:rPr lang="en-GB" sz="2000" dirty="0">
+                <a:latin typeface="APL385 Unicode" panose="020B0709000202000203" pitchFamily="49" charset="0"/>
+              </a:rPr>
+            </a:br>
+            <a:r>
+              <a:rPr lang="en-GB" sz="2000" dirty="0">
+                <a:latin typeface="APL385 Unicode" panose="020B0709000202000203" pitchFamily="49" charset="0"/>
+              </a:rPr>
+              <a:t>    11::0 ⍝ DOMAIN error: return 0</a:t>
+            </a:r>
+            <a:br>
+              <a:rPr lang="en-GB" sz="2000" dirty="0">
+                <a:latin typeface="APL385 Unicode" panose="020B0709000202000203" pitchFamily="49" charset="0"/>
+              </a:rPr>
+            </a:br>
+            <a:r>
+              <a:rPr lang="en-GB" sz="2000" dirty="0">
+                <a:latin typeface="APL385 Unicode" panose="020B0709000202000203" pitchFamily="49" charset="0"/>
+              </a:rPr>
+              <a:t>    ⍺÷⍵}</a:t>
+            </a:r>
+          </a:p>
+          <a:p>
+            <a:pPr marL="0" indent="0">
+              <a:buNone/>
+            </a:pPr>
+            <a:r>
+              <a:rPr lang="en-GB" sz="2000" dirty="0">
+                <a:latin typeface="APL385 Unicode" panose="020B0709000202000203" pitchFamily="49" charset="0"/>
+              </a:rPr>
+              <a:t>      3 div 0</a:t>
+            </a:r>
+            <a:br>
+              <a:rPr lang="en-GB" sz="2000" dirty="0">
+                <a:latin typeface="APL385 Unicode" panose="020B0709000202000203" pitchFamily="49" charset="0"/>
+              </a:rPr>
+            </a:br>
+            <a:r>
+              <a:rPr lang="en-GB" sz="2000" dirty="0">
+                <a:latin typeface="APL385 Unicode" panose="020B0709000202000203" pitchFamily="49" charset="0"/>
+              </a:rPr>
+              <a:t>0</a:t>
+            </a:r>
+          </a:p>
+          <a:p>
+            <a:pPr marL="0" indent="0">
+              <a:buNone/>
+            </a:pPr>
+            <a:r>
+              <a:rPr lang="en-GB" sz="2000" dirty="0">
+                <a:latin typeface="APL385 Unicode" panose="020B0709000202000203" pitchFamily="49" charset="0"/>
+              </a:rPr>
+              <a:t>      1 2 3 div 4 5</a:t>
+            </a:r>
+            <a:br>
+              <a:rPr lang="en-GB" sz="2000" dirty="0">
+                <a:latin typeface="APL385 Unicode" panose="020B0709000202000203" pitchFamily="49" charset="0"/>
+              </a:rPr>
+            </a:br>
+            <a:r>
+              <a:rPr lang="en-GB" sz="2000" dirty="0">
+                <a:latin typeface="APL385 Unicode" panose="020B0709000202000203" pitchFamily="49" charset="0"/>
+              </a:rPr>
+              <a:t>Something Else is Wrong</a:t>
+            </a:r>
+          </a:p>
+          <a:p>
+            <a:endParaRPr lang="en-US" sz="2000" dirty="0">
+              <a:latin typeface="APL385 Unicode" panose="020B0709000202000203" pitchFamily="49" charset="0"/>
+            </a:endParaRPr>
+          </a:p>
+        </p:txBody>
+      </p:sp>
+    </p:spTree>
+    <p:extLst>
+      <p:ext uri="{BB962C8B-B14F-4D97-AF65-F5344CB8AC3E}">
+        <p14:creationId xmlns:p14="http://schemas.microsoft.com/office/powerpoint/2010/main" val="3798476800"/>
+      </p:ext>
+    </p:extLst>
+  </p:cSld>
+  <p:clrMapOvr>
+    <a:masterClrMapping/>
+  </p:clrMapOvr>
+</p:sld>
+</file>
+
 <file path=ppt/slides/slide22.xml><?xml version="1.0" encoding="utf-8"?>
 <p:sld xmlns:a="http://schemas.openxmlformats.org/drawingml/2006/main" xmlns:r="http://schemas.openxmlformats.org/officeDocument/2006/relationships" xmlns:p="http://schemas.openxmlformats.org/presentationml/2006/main">
   <p:cSld>
@@ -5980,14 +6054,10 @@
           <a:lstStyle/>
           <a:p>
             <a:r>
-              <a:rPr lang="en-US" dirty="0"/>
-              <a:t>Error Trapping: </a:t>
-            </a:r>
-            <a:r>
-              <a:rPr lang="en-US" dirty="0" err="1"/>
-              <a:t>Dfns</a:t>
-            </a:r>
-            <a:endParaRPr lang="en-US" dirty="0"/>
+              <a:rPr lang="da-DK" dirty="0"/>
+              <a:t>Error Trapping: Tradfns</a:t>
+            </a:r>
+            <a:endParaRPr lang="en-GB" dirty="0"/>
           </a:p>
         </p:txBody>
       </p:sp>
@@ -6010,54 +6080,29 @@
               <a:buNone/>
             </a:pPr>
             <a:r>
-              <a:rPr lang="en-GB" sz="2000" dirty="0">
-                <a:latin typeface="APL385 Unicode" panose="020B0709000202000203" pitchFamily="49" charset="0"/>
-              </a:rPr>
-              <a:t>div←{0::'Something Else is Wrong' </a:t>
+              <a:rPr lang="da-DK" dirty="0"/>
+              <a:t>Using </a:t>
+            </a:r>
+            <a:r>
+              <a:rPr lang="da-DK" dirty="0">
+                <a:latin typeface="APL385 Unicode" panose="020B0709000202000203" pitchFamily="49" charset="0"/>
+              </a:rPr>
+              <a:t>:Trap</a:t>
             </a:r>
             <a:br>
-              <a:rPr lang="en-GB" sz="2000" dirty="0">
-                <a:latin typeface="APL385 Unicode" panose="020B0709000202000203" pitchFamily="49" charset="0"/>
-              </a:rPr>
+              <a:rPr lang="da-DK" dirty="0"/>
             </a:br>
-            <a:r>
-              <a:rPr lang="en-GB" sz="2000" dirty="0">
-                <a:latin typeface="APL385 Unicode" panose="020B0709000202000203" pitchFamily="49" charset="0"/>
-              </a:rPr>
-              <a:t>    11::0 ⍝ DOMAIN error: return 0</a:t>
-            </a:r>
-            <a:br>
-              <a:rPr lang="en-GB" sz="2000" dirty="0">
-                <a:latin typeface="APL385 Unicode" panose="020B0709000202000203" pitchFamily="49" charset="0"/>
-              </a:rPr>
-            </a:br>
-            <a:r>
-              <a:rPr lang="en-GB" sz="2000" dirty="0">
-                <a:latin typeface="APL385 Unicode" panose="020B0709000202000203" pitchFamily="49" charset="0"/>
-              </a:rPr>
-              <a:t>    ⍺÷⍵}</a:t>
-            </a:r>
+            <a:endParaRPr lang="da-DK" dirty="0"/>
           </a:p>
           <a:p>
             <a:pPr marL="0" indent="0">
               <a:buNone/>
             </a:pPr>
             <a:r>
-              <a:rPr lang="en-GB" sz="2000" dirty="0">
-                <a:latin typeface="APL385 Unicode" panose="020B0709000202000203" pitchFamily="49" charset="0"/>
-              </a:rPr>
-              <a:t>      3 div 0</a:t>
-            </a:r>
-            <a:br>
-              <a:rPr lang="en-GB" sz="2000" dirty="0">
-                <a:latin typeface="APL385 Unicode" panose="020B0709000202000203" pitchFamily="49" charset="0"/>
-              </a:rPr>
-            </a:br>
-            <a:r>
-              <a:rPr lang="en-GB" sz="2000" dirty="0">
-                <a:latin typeface="APL385 Unicode" panose="020B0709000202000203" pitchFamily="49" charset="0"/>
-              </a:rPr>
-              <a:t>0</a:t>
+              <a:rPr lang="en-GB" sz="1800" dirty="0">
+                <a:latin typeface="APL385 Unicode" panose="020B0709000202000203" pitchFamily="49" charset="0"/>
+              </a:rPr>
+              <a:t>     ∇ R←A DIV B</a:t>
             </a:r>
           </a:p>
           <a:p>
@@ -6065,34 +6110,97 @@
               <a:buNone/>
             </a:pPr>
             <a:r>
-              <a:rPr lang="en-GB" sz="2000" dirty="0">
-                <a:latin typeface="APL385 Unicode" panose="020B0709000202000203" pitchFamily="49" charset="0"/>
-              </a:rPr>
-              <a:t>      1 2 3 div 4 5</a:t>
-            </a:r>
-            <a:br>
-              <a:rPr lang="en-GB" sz="2000" dirty="0">
-                <a:latin typeface="APL385 Unicode" panose="020B0709000202000203" pitchFamily="49" charset="0"/>
-              </a:rPr>
-            </a:br>
-            <a:r>
-              <a:rPr lang="en-GB" sz="2000" dirty="0">
-                <a:latin typeface="APL385 Unicode" panose="020B0709000202000203" pitchFamily="49" charset="0"/>
-              </a:rPr>
-              <a:t>Something Else is Wrong</a:t>
-            </a:r>
-          </a:p>
-          <a:p>
-            <a:endParaRPr lang="en-US" sz="2000" dirty="0">
+              <a:rPr lang="en-GB" sz="1800" dirty="0">
+                <a:latin typeface="APL385 Unicode" panose="020B0709000202000203" pitchFamily="49" charset="0"/>
+              </a:rPr>
+              <a:t>[1]    :Trap 0</a:t>
+            </a:r>
+          </a:p>
+          <a:p>
+            <a:pPr marL="0" indent="0">
+              <a:buNone/>
+            </a:pPr>
+            <a:r>
+              <a:rPr lang="en-GB" sz="1800" dirty="0">
+                <a:latin typeface="APL385 Unicode" panose="020B0709000202000203" pitchFamily="49" charset="0"/>
+              </a:rPr>
+              <a:t>[2]        R←A÷B</a:t>
+            </a:r>
+          </a:p>
+          <a:p>
+            <a:pPr marL="0" indent="0">
+              <a:buNone/>
+            </a:pPr>
+            <a:r>
+              <a:rPr lang="en-GB" sz="1800" dirty="0">
+                <a:latin typeface="APL385 Unicode" panose="020B0709000202000203" pitchFamily="49" charset="0"/>
+              </a:rPr>
+              <a:t>[3]    :Case 11 ⋄ R←0 ⍝ DOMAIN error</a:t>
+            </a:r>
+          </a:p>
+          <a:p>
+            <a:pPr marL="0" indent="0">
+              <a:buNone/>
+            </a:pPr>
+            <a:r>
+              <a:rPr lang="en-GB" sz="1800" dirty="0">
+                <a:latin typeface="APL385 Unicode" panose="020B0709000202000203" pitchFamily="49" charset="0"/>
+              </a:rPr>
+              <a:t>[4]    :Else ⋄ </a:t>
+            </a:r>
+            <a:r>
+              <a:rPr lang="en-GB" sz="1800" dirty="0" err="1">
+                <a:latin typeface="APL385 Unicode" panose="020B0709000202000203" pitchFamily="49" charset="0"/>
+              </a:rPr>
+              <a:t>R←'Something</a:t>
+            </a:r>
+            <a:r>
+              <a:rPr lang="en-GB" sz="1800" dirty="0">
+                <a:latin typeface="APL385 Unicode" panose="020B0709000202000203" pitchFamily="49" charset="0"/>
+              </a:rPr>
+              <a:t> Else is Wrong'</a:t>
+            </a:r>
+          </a:p>
+          <a:p>
+            <a:pPr marL="0" indent="0">
+              <a:buNone/>
+            </a:pPr>
+            <a:r>
+              <a:rPr lang="en-GB" sz="1800" dirty="0">
+                <a:latin typeface="APL385 Unicode" panose="020B0709000202000203" pitchFamily="49" charset="0"/>
+              </a:rPr>
+              <a:t>[5]    :</a:t>
+            </a:r>
+            <a:r>
+              <a:rPr lang="en-GB" sz="1800" dirty="0" err="1">
+                <a:latin typeface="APL385 Unicode" panose="020B0709000202000203" pitchFamily="49" charset="0"/>
+              </a:rPr>
+              <a:t>EndTrap</a:t>
+            </a:r>
+            <a:endParaRPr lang="en-GB" sz="1800" dirty="0">
               <a:latin typeface="APL385 Unicode" panose="020B0709000202000203" pitchFamily="49" charset="0"/>
             </a:endParaRPr>
+          </a:p>
+          <a:p>
+            <a:pPr marL="0" indent="0">
+              <a:buNone/>
+            </a:pPr>
+            <a:r>
+              <a:rPr lang="en-GB" sz="1800" dirty="0">
+                <a:latin typeface="APL385 Unicode" panose="020B0709000202000203" pitchFamily="49" charset="0"/>
+              </a:rPr>
+              <a:t>     ∇</a:t>
+            </a:r>
+          </a:p>
+          <a:p>
+            <a:endParaRPr lang="en-GB" dirty="0"/>
           </a:p>
         </p:txBody>
       </p:sp>
     </p:spTree>
     <p:extLst>
       <p:ext uri="{BB962C8B-B14F-4D97-AF65-F5344CB8AC3E}">
-        <p14:creationId xmlns:p14="http://schemas.microsoft.com/office/powerpoint/2010/main" val="3798476800"/>
+        <p14:creationId xmlns:p14="http://schemas.microsoft.com/office/powerpoint/2010/main" val="1823647102"/>
       </p:ext>
     </p:extLst>
   </p:cSld>
@@ -6135,10 +6243,10 @@
           <a:lstStyle/>
           <a:p>
             <a:r>
-              <a:rPr lang="da-DK" dirty="0"/>
+              <a:rPr lang="da-DK"/>
               <a:t>Error Trapping: Tradfns</a:t>
             </a:r>
-            <a:endParaRPr lang="en-GB" dirty="0"/>
+            <a:endParaRPr lang="en-GB"/>
           </a:p>
         </p:txBody>
       </p:sp>
@@ -6168,7 +6276,7 @@
               <a:rPr lang="da-DK" dirty="0">
                 <a:latin typeface="APL385 Unicode" panose="020B0709000202000203" pitchFamily="49" charset="0"/>
               </a:rPr>
-              <a:t>:Trap</a:t>
+              <a:t>⎕TRAP</a:t>
             </a:r>
             <a:br>
               <a:rPr lang="da-DK" dirty="0"/>
@@ -6183,7 +6291,7 @@
               <a:rPr lang="en-GB" sz="1800" dirty="0">
                 <a:latin typeface="APL385 Unicode" panose="020B0709000202000203" pitchFamily="49" charset="0"/>
               </a:rPr>
-              <a:t>     ∇ R←A DIV B</a:t>
+              <a:t>     ∇ R←A DIVQ B;⎕TRAP</a:t>
             </a:r>
           </a:p>
           <a:p>
@@ -6194,7 +6302,7 @@
               <a:rPr lang="en-GB" sz="1800" dirty="0">
                 <a:latin typeface="APL385 Unicode" panose="020B0709000202000203" pitchFamily="49" charset="0"/>
               </a:rPr>
-              <a:t>[1]    :Trap 0</a:t>
+              <a:t>[1]</a:t>
             </a:r>
           </a:p>
           <a:p>
@@ -6205,7 +6313,7 @@
               <a:rPr lang="en-GB" sz="1800" dirty="0">
                 <a:latin typeface="APL385 Unicode" panose="020B0709000202000203" pitchFamily="49" charset="0"/>
               </a:rPr>
-              <a:t>[2]        R←A÷B</a:t>
+              <a:t>[2]    ⎕TRAP←(11 'E' '→DOMERR')(0 'C' '→CATCHALL')</a:t>
             </a:r>
           </a:p>
           <a:p>
@@ -6216,7 +6324,7 @@
               <a:rPr lang="en-GB" sz="1800" dirty="0">
                 <a:latin typeface="APL385 Unicode" panose="020B0709000202000203" pitchFamily="49" charset="0"/>
               </a:rPr>
-              <a:t>[3]    :Case 11 ⋄ R←0 ⍝ DOMAIN error</a:t>
+              <a:t>[3]    R←A÷B ⋄ →0</a:t>
             </a:r>
           </a:p>
           <a:p>
@@ -6227,19 +6335,7 @@
               <a:rPr lang="en-GB" sz="1800" dirty="0">
                 <a:latin typeface="APL385 Unicode" panose="020B0709000202000203" pitchFamily="49" charset="0"/>
               </a:rPr>
-              <a:t>[4]    :Else ⋄ </a:t>
-            </a:r>
-            <a:r>
-              <a:rPr lang="en-GB" sz="1800" dirty="0" err="1">
-                <a:latin typeface="APL385 Unicode" panose="020B0709000202000203" pitchFamily="49" charset="0"/>
-              </a:rPr>
-              <a:t>R←'Something</a:t>
-            </a:r>
-            <a:r>
-              <a:rPr lang="en-GB" sz="1800" dirty="0">
-                <a:latin typeface="APL385 Unicode" panose="020B0709000202000203" pitchFamily="49" charset="0"/>
-              </a:rPr>
-              <a:t> Else is Wrong'</a:t>
+              <a:t>[4]</a:t>
             </a:r>
           </a:p>
           <a:p>
@@ -6250,17 +6346,8 @@
               <a:rPr lang="en-GB" sz="1800" dirty="0">
                 <a:latin typeface="APL385 Unicode" panose="020B0709000202000203" pitchFamily="49" charset="0"/>
               </a:rPr>
-              <a:t>[5]    :</a:t>
-            </a:r>
-            <a:r>
-              <a:rPr lang="en-GB" sz="1800" dirty="0" err="1">
-                <a:latin typeface="APL385 Unicode" panose="020B0709000202000203" pitchFamily="49" charset="0"/>
-              </a:rPr>
-              <a:t>EndTrap</a:t>
-            </a:r>
-            <a:endParaRPr lang="en-GB" sz="1800" dirty="0">
-              <a:latin typeface="APL385 Unicode" panose="020B0709000202000203" pitchFamily="49" charset="0"/>
-            </a:endParaRPr>
+              <a:t>[5]   DOMERR:→R←0</a:t>
+            </a:r>
           </a:p>
           <a:p>
             <a:pPr marL="0" indent="0">
@@ -6270,6 +6357,29 @@
               <a:rPr lang="en-GB" sz="1800" dirty="0">
                 <a:latin typeface="APL385 Unicode" panose="020B0709000202000203" pitchFamily="49" charset="0"/>
               </a:rPr>
+              <a:t>[6]   </a:t>
+            </a:r>
+            <a:r>
+              <a:rPr lang="en-GB" sz="1800" dirty="0" err="1">
+                <a:latin typeface="APL385 Unicode" panose="020B0709000202000203" pitchFamily="49" charset="0"/>
+              </a:rPr>
+              <a:t>CATCHALL:R←'Something</a:t>
+            </a:r>
+            <a:r>
+              <a:rPr lang="en-GB" sz="1800" dirty="0">
+                <a:latin typeface="APL385 Unicode" panose="020B0709000202000203" pitchFamily="49" charset="0"/>
+              </a:rPr>
+              <a:t> Else is Wrong'</a:t>
+            </a:r>
+          </a:p>
+          <a:p>
+            <a:pPr marL="0" indent="0">
+              <a:buNone/>
+            </a:pPr>
+            <a:r>
+              <a:rPr lang="en-GB" sz="1800" dirty="0">
+                <a:latin typeface="APL385 Unicode" panose="020B0709000202000203" pitchFamily="49" charset="0"/>
+              </a:rPr>
               <a:t>     ∇</a:t>
             </a:r>
           </a:p>
@@ -6281,7 +6391,7 @@
     </p:spTree>
     <p:extLst>
       <p:ext uri="{BB962C8B-B14F-4D97-AF65-F5344CB8AC3E}">
-        <p14:creationId xmlns:p14="http://schemas.microsoft.com/office/powerpoint/2010/main" val="1823647102"/>
+        <p14:creationId xmlns:p14="http://schemas.microsoft.com/office/powerpoint/2010/main" val="1804830280"/>
       </p:ext>
     </p:extLst>
   </p:cSld>
@@ -6324,289 +6434,6 @@
           <a:lstStyle/>
           <a:p>
             <a:r>
-              <a:rPr lang="da-DK"/>
-              <a:t>Error Trapping: Tradfns</a:t>
-            </a:r>
-            <a:endParaRPr lang="en-GB"/>
-          </a:p>
-        </p:txBody>
-      </p:sp>
-      <p:sp>
-        <p:nvSpPr>
-          <p:cNvPr id="4" name="Text Placeholder 3"/>
-          <p:cNvSpPr>
-            <a:spLocks noGrp="1"/>
-          </p:cNvSpPr>
-          <p:nvPr>
-            <p:ph type="body" sz="quarter" idx="11"/>
-          </p:nvPr>
-        </p:nvSpPr>
-        <p:spPr/>
-        <p:txBody>
-          <a:bodyPr/>
-          <a:lstStyle/>
-          <a:p>
-            <a:pPr marL="0" indent="0">
-              <a:buNone/>
-            </a:pPr>
-            <a:r>
-              <a:rPr lang="da-DK" dirty="0"/>
-              <a:t>Using </a:t>
-            </a:r>
-            <a:r>
-              <a:rPr lang="da-DK" dirty="0">
-                <a:latin typeface="APL385 Unicode" panose="020B0709000202000203" pitchFamily="49" charset="0"/>
-              </a:rPr>
-              <a:t>⎕TRAP</a:t>
-            </a:r>
-            <a:br>
-              <a:rPr lang="da-DK" dirty="0"/>
-            </a:br>
-            <a:endParaRPr lang="da-DK" dirty="0"/>
-          </a:p>
-          <a:p>
-            <a:pPr marL="0" indent="0">
-              <a:buNone/>
-            </a:pPr>
-            <a:r>
-              <a:rPr lang="en-GB" sz="1800" dirty="0">
-                <a:latin typeface="APL385 Unicode" panose="020B0709000202000203" pitchFamily="49" charset="0"/>
-              </a:rPr>
-              <a:t>     ∇ R←A DIVQ B;⎕TRAP</a:t>
-            </a:r>
-          </a:p>
-          <a:p>
-            <a:pPr marL="0" indent="0">
-              <a:buNone/>
-            </a:pPr>
-            <a:r>
-              <a:rPr lang="en-GB" sz="1800" dirty="0">
-                <a:latin typeface="APL385 Unicode" panose="020B0709000202000203" pitchFamily="49" charset="0"/>
-              </a:rPr>
-              <a:t>[1]</a:t>
-            </a:r>
-          </a:p>
-          <a:p>
-            <a:pPr marL="0" indent="0">
-              <a:buNone/>
-            </a:pPr>
-            <a:r>
-              <a:rPr lang="en-GB" sz="1800" dirty="0">
-                <a:latin typeface="APL385 Unicode" panose="020B0709000202000203" pitchFamily="49" charset="0"/>
-              </a:rPr>
-              <a:t>[2]    ⎕TRAP←(11 'E' '→DOMERR')(0 'C' '→CATCHALL')</a:t>
-            </a:r>
-          </a:p>
-          <a:p>
-            <a:pPr marL="0" indent="0">
-              <a:buNone/>
-            </a:pPr>
-            <a:r>
-              <a:rPr lang="en-GB" sz="1800" dirty="0">
-                <a:latin typeface="APL385 Unicode" panose="020B0709000202000203" pitchFamily="49" charset="0"/>
-              </a:rPr>
-              <a:t>[3]    R←A÷B ⋄ →0</a:t>
-            </a:r>
-          </a:p>
-          <a:p>
-            <a:pPr marL="0" indent="0">
-              <a:buNone/>
-            </a:pPr>
-            <a:r>
-              <a:rPr lang="en-GB" sz="1800" dirty="0">
-                <a:latin typeface="APL385 Unicode" panose="020B0709000202000203" pitchFamily="49" charset="0"/>
-              </a:rPr>
-              <a:t>[4]</a:t>
-            </a:r>
-          </a:p>
-          <a:p>
-            <a:pPr marL="0" indent="0">
-              <a:buNone/>
-            </a:pPr>
-            <a:r>
-              <a:rPr lang="en-GB" sz="1800" dirty="0">
-                <a:latin typeface="APL385 Unicode" panose="020B0709000202000203" pitchFamily="49" charset="0"/>
-              </a:rPr>
-              <a:t>[5]   DOMERR:→R←0</a:t>
-            </a:r>
-          </a:p>
-          <a:p>
-            <a:pPr marL="0" indent="0">
-              <a:buNone/>
-            </a:pPr>
-            <a:r>
-              <a:rPr lang="en-GB" sz="1800" dirty="0">
-                <a:latin typeface="APL385 Unicode" panose="020B0709000202000203" pitchFamily="49" charset="0"/>
-              </a:rPr>
-              <a:t>[6]   </a:t>
-            </a:r>
-            <a:r>
-              <a:rPr lang="en-GB" sz="1800" dirty="0" err="1">
-                <a:latin typeface="APL385 Unicode" panose="020B0709000202000203" pitchFamily="49" charset="0"/>
-              </a:rPr>
-              <a:t>CATCHALL:R←'Something</a:t>
-            </a:r>
-            <a:r>
-              <a:rPr lang="en-GB" sz="1800" dirty="0">
-                <a:latin typeface="APL385 Unicode" panose="020B0709000202000203" pitchFamily="49" charset="0"/>
-              </a:rPr>
-              <a:t> Else is Wrong'</a:t>
-            </a:r>
-          </a:p>
-          <a:p>
-            <a:pPr marL="0" indent="0">
-              <a:buNone/>
-            </a:pPr>
-            <a:r>
-              <a:rPr lang="en-GB" sz="1800" dirty="0">
-                <a:latin typeface="APL385 Unicode" panose="020B0709000202000203" pitchFamily="49" charset="0"/>
-              </a:rPr>
-              <a:t>     ∇</a:t>
-            </a:r>
-          </a:p>
-          <a:p>
-            <a:endParaRPr lang="en-GB" dirty="0"/>
-          </a:p>
-        </p:txBody>
-      </p:sp>
-    </p:spTree>
-    <p:extLst>
-      <p:ext uri="{BB962C8B-B14F-4D97-AF65-F5344CB8AC3E}">
-        <p14:creationId xmlns:p14="http://schemas.microsoft.com/office/powerpoint/2010/main" val="1804830280"/>
-      </p:ext>
-    </p:extLst>
-  </p:cSld>
-  <p:clrMapOvr>
-    <a:masterClrMapping/>
-  </p:clrMapOvr>
-</p:sld>
-</file>
-
-<file path=ppt/slides/slide25.xml><?xml version="1.0" encoding="utf-8"?>
-<p:sld xmlns:a="http://schemas.openxmlformats.org/drawingml/2006/main" xmlns:r="http://schemas.openxmlformats.org/officeDocument/2006/relationships" xmlns:p="http://schemas.openxmlformats.org/presentationml/2006/main">
-  <p:cSld>
-    <p:spTree>
-      <p:nvGrpSpPr>
-        <p:cNvPr id="1" name=""/>
-        <p:cNvGrpSpPr/>
-        <p:nvPr/>
-      </p:nvGrpSpPr>
-      <p:grpSpPr>
-        <a:xfrm>
-          <a:off x="0" y="0"/>
-          <a:ext cx="0" cy="0"/>
-          <a:chOff x="0" y="0"/>
-          <a:chExt cx="0" cy="0"/>
-        </a:xfrm>
-      </p:grpSpPr>
-      <p:sp>
-        <p:nvSpPr>
-          <p:cNvPr id="3" name="Title 2"/>
-          <p:cNvSpPr>
-            <a:spLocks noGrp="1"/>
-          </p:cNvSpPr>
-          <p:nvPr>
-            <p:ph type="title"/>
-          </p:nvPr>
-        </p:nvSpPr>
-        <p:spPr/>
-        <p:txBody>
-          <a:bodyPr/>
-          <a:lstStyle/>
-          <a:p>
-            <a:r>
-              <a:rPr lang="en-US" dirty="0"/>
-              <a:t>System Functions</a:t>
-            </a:r>
-          </a:p>
-        </p:txBody>
-      </p:sp>
-      <p:sp>
-        <p:nvSpPr>
-          <p:cNvPr id="4" name="Text Placeholder 3"/>
-          <p:cNvSpPr>
-            <a:spLocks noGrp="1"/>
-          </p:cNvSpPr>
-          <p:nvPr>
-            <p:ph type="body" sz="quarter" idx="11"/>
-          </p:nvPr>
-        </p:nvSpPr>
-        <p:spPr/>
-        <p:txBody>
-          <a:bodyPr/>
-          <a:lstStyle/>
-          <a:p>
-            <a:pPr marL="0" indent="0">
-              <a:buNone/>
-            </a:pPr>
-            <a:r>
-              <a:rPr lang="en-US" sz="2400" dirty="0"/>
-              <a:t>(built-in library functions)</a:t>
-            </a:r>
-          </a:p>
-          <a:p>
-            <a:pPr marL="0" indent="0">
-              <a:buNone/>
-            </a:pPr>
-            <a:endParaRPr lang="en-US" sz="2400" dirty="0"/>
-          </a:p>
-          <a:p>
-            <a:pPr marL="0" indent="0">
-              <a:buNone/>
-            </a:pPr>
-            <a:r>
-              <a:rPr lang="en-US" sz="2400" dirty="0"/>
-              <a:t>]demo sysfns.txt</a:t>
-            </a:r>
-          </a:p>
-        </p:txBody>
-      </p:sp>
-    </p:spTree>
-    <p:extLst>
-      <p:ext uri="{BB962C8B-B14F-4D97-AF65-F5344CB8AC3E}">
-        <p14:creationId xmlns:p14="http://schemas.microsoft.com/office/powerpoint/2010/main" val="672594876"/>
-      </p:ext>
-    </p:extLst>
-  </p:cSld>
-  <p:clrMapOvr>
-    <a:masterClrMapping/>
-  </p:clrMapOvr>
-</p:sld>
-</file>
-
-<file path=ppt/slides/slide26.xml><?xml version="1.0" encoding="utf-8"?>
-<p:sld xmlns:a="http://schemas.openxmlformats.org/drawingml/2006/main" xmlns:r="http://schemas.openxmlformats.org/officeDocument/2006/relationships" xmlns:p="http://schemas.openxmlformats.org/presentationml/2006/main">
-  <p:cSld>
-    <p:spTree>
-      <p:nvGrpSpPr>
-        <p:cNvPr id="1" name=""/>
-        <p:cNvGrpSpPr/>
-        <p:nvPr/>
-      </p:nvGrpSpPr>
-      <p:grpSpPr>
-        <a:xfrm>
-          <a:off x="0" y="0"/>
-          <a:ext cx="0" cy="0"/>
-          <a:chOff x="0" y="0"/>
-          <a:chExt cx="0" cy="0"/>
-        </a:xfrm>
-      </p:grpSpPr>
-      <p:sp>
-        <p:nvSpPr>
-          <p:cNvPr id="3" name="Title 2"/>
-          <p:cNvSpPr>
-            <a:spLocks noGrp="1"/>
-          </p:cNvSpPr>
-          <p:nvPr>
-            <p:ph type="title"/>
-          </p:nvPr>
-        </p:nvSpPr>
-        <p:spPr/>
-        <p:txBody>
-          <a:bodyPr/>
-          <a:lstStyle/>
-          <a:p>
-            <a:r>
               <a:rPr lang="en-US" dirty="0"/>
               <a:t>Building Applications</a:t>
             </a:r>
@@ -6725,7 +6552,7 @@
 </p:sld>
 </file>
 
-<file path=ppt/slides/slide27.xml><?xml version="1.0" encoding="utf-8"?>
+<file path=ppt/slides/slide25.xml><?xml version="1.0" encoding="utf-8"?>
 <p:sld xmlns:a="http://schemas.openxmlformats.org/drawingml/2006/main" xmlns:r="http://schemas.openxmlformats.org/officeDocument/2006/relationships" xmlns:p="http://schemas.openxmlformats.org/presentationml/2006/main">
   <p:cSld>
     <p:spTree>

</xml_diff>